<commit_message>
Finalizado fluxograma Atualizado linhas dos graficos estratificados por área, arquivo de dispensa
</commit_message>
<xml_diff>
--- a/Apresentações - ATAS de Reunião/TRE – Projeto PUC PR_16122016.pptx
+++ b/Apresentações - ATAS de Reunião/TRE – Projeto PUC PR_16122016.pptx
@@ -11,7 +11,11 @@
     <p:sldId id="259" r:id="rId5"/>
     <p:sldId id="260" r:id="rId6"/>
     <p:sldId id="262" r:id="rId7"/>
-    <p:sldId id="261" r:id="rId8"/>
+    <p:sldId id="263" r:id="rId8"/>
+    <p:sldId id="264" r:id="rId9"/>
+    <p:sldId id="265" r:id="rId10"/>
+    <p:sldId id="266" r:id="rId11"/>
+    <p:sldId id="261" r:id="rId12"/>
   </p:sldIdLst>
   <p:sldSz cx="9144000" cy="6858000" type="screen4x3"/>
   <p:notesSz cx="6858000" cy="9144000"/>
@@ -369,11 +373,11 @@
           <c:showBubbleSize val="0"/>
         </c:dLbls>
         <c:gapWidth val="150"/>
-        <c:axId val="233481216"/>
-        <c:axId val="190682176"/>
+        <c:axId val="150441472"/>
+        <c:axId val="163779072"/>
       </c:barChart>
       <c:catAx>
-        <c:axId val="233481216"/>
+        <c:axId val="150441472"/>
         <c:scaling>
           <c:orientation val="minMax"/>
         </c:scaling>
@@ -392,7 +396,7 @@
             <a:endParaRPr lang="en-US"/>
           </a:p>
         </c:txPr>
-        <c:crossAx val="190682176"/>
+        <c:crossAx val="163779072"/>
         <c:crosses val="autoZero"/>
         <c:auto val="1"/>
         <c:lblAlgn val="ctr"/>
@@ -400,7 +404,7 @@
         <c:noMultiLvlLbl val="0"/>
       </c:catAx>
       <c:valAx>
-        <c:axId val="190682176"/>
+        <c:axId val="163779072"/>
         <c:scaling>
           <c:orientation val="minMax"/>
         </c:scaling>
@@ -411,7 +415,7 @@
         <c:majorTickMark val="out"/>
         <c:minorTickMark val="none"/>
         <c:tickLblPos val="nextTo"/>
-        <c:crossAx val="233481216"/>
+        <c:crossAx val="150441472"/>
         <c:crosses val="autoZero"/>
         <c:crossBetween val="between"/>
       </c:valAx>
@@ -421,6 +425,712 @@
     <c:showDLblsOverMax val="0"/>
   </c:chart>
   <c:externalData r:id="rId2">
+    <c:autoUpdate val="0"/>
+  </c:externalData>
+</c:chartSpace>
+</file>
+
+<file path=ppt/charts/chart2.xml><?xml version="1.0" encoding="utf-8"?>
+<c:chartSpace xmlns:c="http://schemas.openxmlformats.org/drawingml/2006/chart" xmlns:a="http://schemas.openxmlformats.org/drawingml/2006/main" xmlns:r="http://schemas.openxmlformats.org/officeDocument/2006/relationships">
+  <c:date1904 val="0"/>
+  <c:lang val="en-US"/>
+  <c:roundedCorners val="0"/>
+  <mc:AlternateContent xmlns:mc="http://schemas.openxmlformats.org/markup-compatibility/2006">
+    <mc:Choice xmlns:c14="http://schemas.microsoft.com/office/drawing/2007/8/2/chart" Requires="c14">
+      <c14:style val="102"/>
+    </mc:Choice>
+    <mc:Fallback>
+      <c:style val="2"/>
+    </mc:Fallback>
+  </mc:AlternateContent>
+  <c:chart>
+    <c:title>
+      <c:tx>
+        <c:rich>
+          <a:bodyPr rot="0" spcFirstLastPara="1" vertOverflow="ellipsis" vert="horz" wrap="square" anchor="ctr" anchorCtr="1"/>
+          <a:lstStyle/>
+          <a:p>
+            <a:pPr>
+              <a:defRPr sz="1400" b="0" i="0" u="none" strike="noStrike" kern="1200" spc="0" baseline="0">
+                <a:solidFill>
+                  <a:schemeClr val="tx1">
+                    <a:lumMod val="65000"/>
+                    <a:lumOff val="35000"/>
+                  </a:schemeClr>
+                </a:solidFill>
+                <a:latin typeface="+mn-lt"/>
+                <a:ea typeface="+mn-ea"/>
+                <a:cs typeface="+mn-cs"/>
+              </a:defRPr>
+            </a:pPr>
+            <a:r>
+              <a:rPr lang="en-US"/>
+              <a:t>PAD</a:t>
+            </a:r>
+            <a:r>
+              <a:rPr lang="en-US" baseline="0"/>
+              <a:t> - 2462 -DISPENSA - Alarme e Monitoramento</a:t>
+            </a:r>
+            <a:endParaRPr lang="en-US"/>
+          </a:p>
+        </c:rich>
+      </c:tx>
+      <c:layout/>
+      <c:overlay val="0"/>
+      <c:spPr>
+        <a:noFill/>
+        <a:ln>
+          <a:noFill/>
+        </a:ln>
+        <a:effectLst/>
+      </c:spPr>
+    </c:title>
+    <c:autoTitleDeleted val="0"/>
+    <c:plotArea>
+      <c:layout/>
+      <c:barChart>
+        <c:barDir val="bar"/>
+        <c:grouping val="clustered"/>
+        <c:varyColors val="0"/>
+        <c:ser>
+          <c:idx val="0"/>
+          <c:order val="0"/>
+          <c:spPr>
+            <a:solidFill>
+              <a:srgbClr val="C00000"/>
+            </a:solidFill>
+            <a:ln>
+              <a:noFill/>
+            </a:ln>
+            <a:effectLst/>
+          </c:spPr>
+          <c:invertIfNegative val="0"/>
+          <c:cat>
+            <c:strRef>
+              <c:f>Plan1!$L$3:$L$20</c:f>
+              <c:strCache>
+                <c:ptCount val="18"/>
+                <c:pt idx="0">
+                  <c:v>041ZE  </c:v>
+                </c:pt>
+                <c:pt idx="1">
+                  <c:v>DG  </c:v>
+                </c:pt>
+                <c:pt idx="2">
+                  <c:v>ASSISEG  </c:v>
+                </c:pt>
+                <c:pt idx="3">
+                  <c:v>CAA  </c:v>
+                </c:pt>
+                <c:pt idx="4">
+                  <c:v>SECADM  </c:v>
+                </c:pt>
+                <c:pt idx="5">
+                  <c:v> SPO  </c:v>
+                </c:pt>
+                <c:pt idx="6">
+                  <c:v> CO  </c:v>
+                </c:pt>
+                <c:pt idx="7">
+                  <c:v>SECOFC  </c:v>
+                </c:pt>
+                <c:pt idx="8">
+                  <c:v>CLC  </c:v>
+                </c:pt>
+                <c:pt idx="9">
+                  <c:v>SC  </c:v>
+                </c:pt>
+                <c:pt idx="10">
+                  <c:v>SCON  </c:v>
+                </c:pt>
+                <c:pt idx="11">
+                  <c:v>SECOFC  </c:v>
+                </c:pt>
+                <c:pt idx="12">
+                  <c:v>SPO  </c:v>
+                </c:pt>
+                <c:pt idx="13">
+                  <c:v>CO  </c:v>
+                </c:pt>
+                <c:pt idx="14">
+                  <c:v>CPL  </c:v>
+                </c:pt>
+                <c:pt idx="15">
+                  <c:v>ASSDG  </c:v>
+                </c:pt>
+                <c:pt idx="16">
+                  <c:v>ACO  </c:v>
+                </c:pt>
+                <c:pt idx="17">
+                  <c:v>SAEO  </c:v>
+                </c:pt>
+              </c:strCache>
+            </c:strRef>
+          </c:cat>
+          <c:val>
+            <c:numRef>
+              <c:f>Plan1!$M$3:$M$20</c:f>
+              <c:numCache>
+                <c:formatCode>General</c:formatCode>
+                <c:ptCount val="18"/>
+                <c:pt idx="0">
+                  <c:v>4</c:v>
+                </c:pt>
+                <c:pt idx="1">
+                  <c:v>3</c:v>
+                </c:pt>
+                <c:pt idx="2">
+                  <c:v>30</c:v>
+                </c:pt>
+                <c:pt idx="3">
+                  <c:v>9</c:v>
+                </c:pt>
+                <c:pt idx="4">
+                  <c:v>4</c:v>
+                </c:pt>
+                <c:pt idx="5">
+                  <c:v>1</c:v>
+                </c:pt>
+                <c:pt idx="6">
+                  <c:v>1</c:v>
+                </c:pt>
+                <c:pt idx="7">
+                  <c:v>3</c:v>
+                </c:pt>
+                <c:pt idx="8">
+                  <c:v>7</c:v>
+                </c:pt>
+                <c:pt idx="9">
+                  <c:v>17</c:v>
+                </c:pt>
+                <c:pt idx="10">
+                  <c:v>18</c:v>
+                </c:pt>
+                <c:pt idx="11">
+                  <c:v>3</c:v>
+                </c:pt>
+                <c:pt idx="12">
+                  <c:v>1</c:v>
+                </c:pt>
+                <c:pt idx="13">
+                  <c:v>2</c:v>
+                </c:pt>
+                <c:pt idx="14">
+                  <c:v>3</c:v>
+                </c:pt>
+                <c:pt idx="15">
+                  <c:v>7</c:v>
+                </c:pt>
+                <c:pt idx="16">
+                  <c:v>2</c:v>
+                </c:pt>
+                <c:pt idx="17">
+                  <c:v>1</c:v>
+                </c:pt>
+              </c:numCache>
+            </c:numRef>
+          </c:val>
+        </c:ser>
+        <c:dLbls>
+          <c:showLegendKey val="0"/>
+          <c:showVal val="0"/>
+          <c:showCatName val="0"/>
+          <c:showSerName val="0"/>
+          <c:showPercent val="0"/>
+          <c:showBubbleSize val="0"/>
+        </c:dLbls>
+        <c:gapWidth val="182"/>
+        <c:axId val="147076608"/>
+        <c:axId val="146966208"/>
+      </c:barChart>
+      <c:catAx>
+        <c:axId val="147076608"/>
+        <c:scaling>
+          <c:orientation val="minMax"/>
+        </c:scaling>
+        <c:delete val="0"/>
+        <c:axPos val="l"/>
+        <c:numFmt formatCode="General" sourceLinked="1"/>
+        <c:majorTickMark val="none"/>
+        <c:minorTickMark val="none"/>
+        <c:tickLblPos val="nextTo"/>
+        <c:spPr>
+          <a:noFill/>
+          <a:ln w="9525" cap="flat" cmpd="sng" algn="ctr">
+            <a:solidFill>
+              <a:schemeClr val="tx1">
+                <a:lumMod val="15000"/>
+                <a:lumOff val="85000"/>
+              </a:schemeClr>
+            </a:solidFill>
+            <a:round/>
+          </a:ln>
+          <a:effectLst/>
+        </c:spPr>
+        <c:txPr>
+          <a:bodyPr rot="-60000000" spcFirstLastPara="1" vertOverflow="ellipsis" vert="horz" wrap="square" anchor="ctr" anchorCtr="1"/>
+          <a:lstStyle/>
+          <a:p>
+            <a:pPr>
+              <a:defRPr sz="900" b="0" i="0" u="none" strike="noStrike" kern="1200" baseline="0">
+                <a:solidFill>
+                  <a:schemeClr val="tx1">
+                    <a:lumMod val="65000"/>
+                    <a:lumOff val="35000"/>
+                  </a:schemeClr>
+                </a:solidFill>
+                <a:latin typeface="+mn-lt"/>
+                <a:ea typeface="+mn-ea"/>
+                <a:cs typeface="+mn-cs"/>
+              </a:defRPr>
+            </a:pPr>
+            <a:endParaRPr lang="en-US"/>
+          </a:p>
+        </c:txPr>
+        <c:crossAx val="146966208"/>
+        <c:crosses val="autoZero"/>
+        <c:auto val="1"/>
+        <c:lblAlgn val="ctr"/>
+        <c:lblOffset val="100"/>
+        <c:noMultiLvlLbl val="0"/>
+      </c:catAx>
+      <c:valAx>
+        <c:axId val="146966208"/>
+        <c:scaling>
+          <c:orientation val="minMax"/>
+        </c:scaling>
+        <c:delete val="0"/>
+        <c:axPos val="b"/>
+        <c:majorGridlines>
+          <c:spPr>
+            <a:ln w="9525" cap="flat" cmpd="sng" algn="ctr">
+              <a:solidFill>
+                <a:schemeClr val="tx1">
+                  <a:lumMod val="15000"/>
+                  <a:lumOff val="85000"/>
+                </a:schemeClr>
+              </a:solidFill>
+              <a:round/>
+            </a:ln>
+            <a:effectLst/>
+          </c:spPr>
+        </c:majorGridlines>
+        <c:numFmt formatCode="General" sourceLinked="1"/>
+        <c:majorTickMark val="none"/>
+        <c:minorTickMark val="none"/>
+        <c:tickLblPos val="nextTo"/>
+        <c:spPr>
+          <a:noFill/>
+          <a:ln>
+            <a:noFill/>
+          </a:ln>
+          <a:effectLst/>
+        </c:spPr>
+        <c:txPr>
+          <a:bodyPr rot="-60000000" spcFirstLastPara="1" vertOverflow="ellipsis" vert="horz" wrap="square" anchor="ctr" anchorCtr="1"/>
+          <a:lstStyle/>
+          <a:p>
+            <a:pPr>
+              <a:defRPr sz="900" b="0" i="0" u="none" strike="noStrike" kern="1200" baseline="0">
+                <a:solidFill>
+                  <a:schemeClr val="tx1">
+                    <a:lumMod val="65000"/>
+                    <a:lumOff val="35000"/>
+                  </a:schemeClr>
+                </a:solidFill>
+                <a:latin typeface="+mn-lt"/>
+                <a:ea typeface="+mn-ea"/>
+                <a:cs typeface="+mn-cs"/>
+              </a:defRPr>
+            </a:pPr>
+            <a:endParaRPr lang="en-US"/>
+          </a:p>
+        </c:txPr>
+        <c:crossAx val="147076608"/>
+        <c:crosses val="autoZero"/>
+        <c:crossBetween val="between"/>
+      </c:valAx>
+      <c:spPr>
+        <a:noFill/>
+        <a:ln w="25400">
+          <a:noFill/>
+        </a:ln>
+      </c:spPr>
+    </c:plotArea>
+    <c:plotVisOnly val="1"/>
+    <c:dispBlanksAs val="gap"/>
+    <c:showDLblsOverMax val="0"/>
+  </c:chart>
+  <c:spPr>
+    <a:solidFill>
+      <a:schemeClr val="bg1"/>
+    </a:solidFill>
+    <a:ln w="9525" cap="flat" cmpd="sng" algn="ctr">
+      <a:solidFill>
+        <a:schemeClr val="tx1">
+          <a:lumMod val="15000"/>
+          <a:lumOff val="85000"/>
+        </a:schemeClr>
+      </a:solidFill>
+      <a:round/>
+    </a:ln>
+    <a:effectLst/>
+  </c:spPr>
+  <c:txPr>
+    <a:bodyPr/>
+    <a:lstStyle/>
+    <a:p>
+      <a:pPr>
+        <a:defRPr/>
+      </a:pPr>
+      <a:endParaRPr lang="en-US"/>
+    </a:p>
+  </c:txPr>
+  <c:externalData r:id="rId1">
+    <c:autoUpdate val="0"/>
+  </c:externalData>
+</c:chartSpace>
+</file>
+
+<file path=ppt/charts/chart3.xml><?xml version="1.0" encoding="utf-8"?>
+<c:chartSpace xmlns:c="http://schemas.openxmlformats.org/drawingml/2006/chart" xmlns:a="http://schemas.openxmlformats.org/drawingml/2006/main" xmlns:r="http://schemas.openxmlformats.org/officeDocument/2006/relationships">
+  <c:date1904 val="0"/>
+  <c:lang val="en-US"/>
+  <c:roundedCorners val="0"/>
+  <mc:AlternateContent xmlns:mc="http://schemas.openxmlformats.org/markup-compatibility/2006">
+    <mc:Choice xmlns:c14="http://schemas.microsoft.com/office/drawing/2007/8/2/chart" Requires="c14">
+      <c14:style val="102"/>
+    </mc:Choice>
+    <mc:Fallback>
+      <c:style val="2"/>
+    </mc:Fallback>
+  </mc:AlternateContent>
+  <c:chart>
+    <c:title>
+      <c:tx>
+        <c:rich>
+          <a:bodyPr rot="0" spcFirstLastPara="1" vertOverflow="ellipsis" vert="horz" wrap="square" anchor="ctr" anchorCtr="1"/>
+          <a:lstStyle/>
+          <a:p>
+            <a:pPr>
+              <a:defRPr sz="1400" b="0" i="0" u="none" strike="noStrike" kern="1200" spc="0" baseline="0">
+                <a:solidFill>
+                  <a:schemeClr val="tx1">
+                    <a:lumMod val="65000"/>
+                    <a:lumOff val="35000"/>
+                  </a:schemeClr>
+                </a:solidFill>
+                <a:latin typeface="+mn-lt"/>
+                <a:ea typeface="+mn-ea"/>
+                <a:cs typeface="+mn-cs"/>
+              </a:defRPr>
+            </a:pPr>
+            <a:r>
+              <a:rPr lang="en-US"/>
+              <a:t>6475/2015</a:t>
+            </a:r>
+            <a:r>
+              <a:rPr lang="en-US" baseline="0"/>
+              <a:t> -Dispensa  Alarme Monitoramento</a:t>
+            </a:r>
+            <a:endParaRPr lang="en-US"/>
+          </a:p>
+        </c:rich>
+      </c:tx>
+      <c:layout/>
+      <c:overlay val="0"/>
+      <c:spPr>
+        <a:noFill/>
+        <a:ln>
+          <a:noFill/>
+        </a:ln>
+        <a:effectLst/>
+      </c:spPr>
+    </c:title>
+    <c:autoTitleDeleted val="0"/>
+    <c:plotArea>
+      <c:layout/>
+      <c:barChart>
+        <c:barDir val="bar"/>
+        <c:grouping val="clustered"/>
+        <c:varyColors val="0"/>
+        <c:ser>
+          <c:idx val="0"/>
+          <c:order val="0"/>
+          <c:spPr>
+            <a:solidFill>
+              <a:srgbClr val="C00000"/>
+            </a:solidFill>
+            <a:ln>
+              <a:noFill/>
+            </a:ln>
+            <a:effectLst/>
+          </c:spPr>
+          <c:invertIfNegative val="0"/>
+          <c:cat>
+            <c:strRef>
+              <c:f>Plan1!$L$50:$L$64</c:f>
+              <c:strCache>
+                <c:ptCount val="15"/>
+                <c:pt idx="0">
+                  <c:v>140ZE  </c:v>
+                </c:pt>
+                <c:pt idx="1">
+                  <c:v>ASSISEG  </c:v>
+                </c:pt>
+                <c:pt idx="2">
+                  <c:v>CAA  </c:v>
+                </c:pt>
+                <c:pt idx="3">
+                  <c:v>SECADM  </c:v>
+                </c:pt>
+                <c:pt idx="4">
+                  <c:v>SPO  </c:v>
+                </c:pt>
+                <c:pt idx="5">
+                  <c:v>CO  </c:v>
+                </c:pt>
+                <c:pt idx="6">
+                  <c:v>SECOFC  </c:v>
+                </c:pt>
+                <c:pt idx="7">
+                  <c:v>CLC  </c:v>
+                </c:pt>
+                <c:pt idx="8">
+                  <c:v>SC  </c:v>
+                </c:pt>
+                <c:pt idx="9">
+                  <c:v>SCON  </c:v>
+                </c:pt>
+                <c:pt idx="10">
+                  <c:v>ASSDG  </c:v>
+                </c:pt>
+                <c:pt idx="11">
+                  <c:v>CLC  </c:v>
+                </c:pt>
+                <c:pt idx="12">
+                  <c:v>DG  </c:v>
+                </c:pt>
+                <c:pt idx="13">
+                  <c:v>ACO  </c:v>
+                </c:pt>
+                <c:pt idx="14">
+                  <c:v>SAEO  </c:v>
+                </c:pt>
+              </c:strCache>
+            </c:strRef>
+          </c:cat>
+          <c:val>
+            <c:numRef>
+              <c:f>Plan1!$M$50:$M$64</c:f>
+              <c:numCache>
+                <c:formatCode>General</c:formatCode>
+                <c:ptCount val="15"/>
+                <c:pt idx="0">
+                  <c:v>10</c:v>
+                </c:pt>
+                <c:pt idx="1">
+                  <c:v>1</c:v>
+                </c:pt>
+                <c:pt idx="2">
+                  <c:v>5</c:v>
+                </c:pt>
+                <c:pt idx="3">
+                  <c:v>2</c:v>
+                </c:pt>
+                <c:pt idx="4">
+                  <c:v>2</c:v>
+                </c:pt>
+                <c:pt idx="5">
+                  <c:v>2</c:v>
+                </c:pt>
+                <c:pt idx="6">
+                  <c:v>2</c:v>
+                </c:pt>
+                <c:pt idx="7">
+                  <c:v>6</c:v>
+                </c:pt>
+                <c:pt idx="8">
+                  <c:v>12</c:v>
+                </c:pt>
+                <c:pt idx="9">
+                  <c:v>32</c:v>
+                </c:pt>
+                <c:pt idx="10">
+                  <c:v>6</c:v>
+                </c:pt>
+                <c:pt idx="11">
+                  <c:v>8</c:v>
+                </c:pt>
+                <c:pt idx="12">
+                  <c:v>2</c:v>
+                </c:pt>
+                <c:pt idx="13">
+                  <c:v>1</c:v>
+                </c:pt>
+                <c:pt idx="14">
+                  <c:v>2</c:v>
+                </c:pt>
+              </c:numCache>
+            </c:numRef>
+          </c:val>
+        </c:ser>
+        <c:dLbls>
+          <c:showLegendKey val="0"/>
+          <c:showVal val="0"/>
+          <c:showCatName val="0"/>
+          <c:showSerName val="0"/>
+          <c:showPercent val="0"/>
+          <c:showBubbleSize val="0"/>
+        </c:dLbls>
+        <c:gapWidth val="182"/>
+        <c:axId val="14239744"/>
+        <c:axId val="164880384"/>
+      </c:barChart>
+      <c:catAx>
+        <c:axId val="14239744"/>
+        <c:scaling>
+          <c:orientation val="minMax"/>
+        </c:scaling>
+        <c:delete val="0"/>
+        <c:axPos val="l"/>
+        <c:numFmt formatCode="General" sourceLinked="1"/>
+        <c:majorTickMark val="none"/>
+        <c:minorTickMark val="none"/>
+        <c:tickLblPos val="nextTo"/>
+        <c:spPr>
+          <a:noFill/>
+          <a:ln w="9525" cap="flat" cmpd="sng" algn="ctr">
+            <a:solidFill>
+              <a:schemeClr val="tx1">
+                <a:lumMod val="15000"/>
+                <a:lumOff val="85000"/>
+              </a:schemeClr>
+            </a:solidFill>
+            <a:round/>
+          </a:ln>
+          <a:effectLst/>
+        </c:spPr>
+        <c:txPr>
+          <a:bodyPr rot="-60000000" spcFirstLastPara="1" vertOverflow="ellipsis" vert="horz" wrap="square" anchor="ctr" anchorCtr="1"/>
+          <a:lstStyle/>
+          <a:p>
+            <a:pPr>
+              <a:defRPr sz="900" b="0" i="0" u="none" strike="noStrike" kern="1200" baseline="0">
+                <a:solidFill>
+                  <a:schemeClr val="tx1">
+                    <a:lumMod val="65000"/>
+                    <a:lumOff val="35000"/>
+                  </a:schemeClr>
+                </a:solidFill>
+                <a:latin typeface="+mn-lt"/>
+                <a:ea typeface="+mn-ea"/>
+                <a:cs typeface="+mn-cs"/>
+              </a:defRPr>
+            </a:pPr>
+            <a:endParaRPr lang="en-US"/>
+          </a:p>
+        </c:txPr>
+        <c:crossAx val="164880384"/>
+        <c:crosses val="autoZero"/>
+        <c:auto val="1"/>
+        <c:lblAlgn val="ctr"/>
+        <c:lblOffset val="100"/>
+        <c:noMultiLvlLbl val="0"/>
+      </c:catAx>
+      <c:valAx>
+        <c:axId val="164880384"/>
+        <c:scaling>
+          <c:orientation val="minMax"/>
+        </c:scaling>
+        <c:delete val="0"/>
+        <c:axPos val="b"/>
+        <c:majorGridlines>
+          <c:spPr>
+            <a:ln w="9525" cap="flat" cmpd="sng" algn="ctr">
+              <a:solidFill>
+                <a:schemeClr val="tx1">
+                  <a:lumMod val="15000"/>
+                  <a:lumOff val="85000"/>
+                </a:schemeClr>
+              </a:solidFill>
+              <a:round/>
+            </a:ln>
+            <a:effectLst/>
+          </c:spPr>
+        </c:majorGridlines>
+        <c:numFmt formatCode="General" sourceLinked="1"/>
+        <c:majorTickMark val="none"/>
+        <c:minorTickMark val="none"/>
+        <c:tickLblPos val="nextTo"/>
+        <c:spPr>
+          <a:noFill/>
+          <a:ln>
+            <a:noFill/>
+          </a:ln>
+          <a:effectLst/>
+        </c:spPr>
+        <c:txPr>
+          <a:bodyPr rot="-60000000" spcFirstLastPara="1" vertOverflow="ellipsis" vert="horz" wrap="square" anchor="ctr" anchorCtr="1"/>
+          <a:lstStyle/>
+          <a:p>
+            <a:pPr>
+              <a:defRPr sz="900" b="0" i="0" u="none" strike="noStrike" kern="1200" baseline="0">
+                <a:solidFill>
+                  <a:schemeClr val="tx1">
+                    <a:lumMod val="65000"/>
+                    <a:lumOff val="35000"/>
+                  </a:schemeClr>
+                </a:solidFill>
+                <a:latin typeface="+mn-lt"/>
+                <a:ea typeface="+mn-ea"/>
+                <a:cs typeface="+mn-cs"/>
+              </a:defRPr>
+            </a:pPr>
+            <a:endParaRPr lang="en-US"/>
+          </a:p>
+        </c:txPr>
+        <c:crossAx val="14239744"/>
+        <c:crosses val="autoZero"/>
+        <c:crossBetween val="between"/>
+      </c:valAx>
+      <c:spPr>
+        <a:noFill/>
+        <a:ln w="25400">
+          <a:noFill/>
+        </a:ln>
+      </c:spPr>
+    </c:plotArea>
+    <c:plotVisOnly val="1"/>
+    <c:dispBlanksAs val="gap"/>
+    <c:showDLblsOverMax val="0"/>
+  </c:chart>
+  <c:spPr>
+    <a:solidFill>
+      <a:schemeClr val="bg1"/>
+    </a:solidFill>
+    <a:ln w="9525" cap="flat" cmpd="sng" algn="ctr">
+      <a:solidFill>
+        <a:schemeClr val="tx1">
+          <a:lumMod val="15000"/>
+          <a:lumOff val="85000"/>
+        </a:schemeClr>
+      </a:solidFill>
+      <a:round/>
+    </a:ln>
+    <a:effectLst/>
+  </c:spPr>
+  <c:txPr>
+    <a:bodyPr/>
+    <a:lstStyle/>
+    <a:p>
+      <a:pPr>
+        <a:defRPr/>
+      </a:pPr>
+      <a:endParaRPr lang="en-US"/>
+    </a:p>
+  </c:txPr>
+  <c:externalData r:id="rId1">
     <c:autoUpdate val="0"/>
   </c:externalData>
 </c:chartSpace>
@@ -3454,7 +4164,18 @@
           <a:p>
             <a:r>
               <a:rPr lang="pt-BR" dirty="0" smtClean="0"/>
-              <a:t>Reunião: 16/12/2016</a:t>
+              <a:t>Reunião: </a:t>
+            </a:r>
+            <a:r>
+              <a:rPr lang="pt-BR" dirty="0" smtClean="0"/>
+              <a:t>16/12/2016</a:t>
+            </a:r>
+            <a:endParaRPr lang="en-US" dirty="0"/>
+          </a:p>
+          <a:p>
+            <a:r>
+              <a:rPr lang="pt-BR" dirty="0" smtClean="0"/>
+              <a:t>DEFINE</a:t>
             </a:r>
             <a:endParaRPr lang="en-US" dirty="0"/>
           </a:p>
@@ -3464,6 +4185,329 @@
     <p:extLst>
       <p:ext uri="{BB962C8B-B14F-4D97-AF65-F5344CB8AC3E}">
         <p14:creationId xmlns:p14="http://schemas.microsoft.com/office/powerpoint/2010/main" val="2750076050"/>
+      </p:ext>
+    </p:extLst>
+  </p:cSld>
+  <p:clrMapOvr>
+    <a:masterClrMapping/>
+  </p:clrMapOvr>
+  <p:timing>
+    <p:tnLst>
+      <p:par>
+        <p:cTn id="1" dur="indefinite" restart="never" nodeType="tmRoot"/>
+      </p:par>
+    </p:tnLst>
+  </p:timing>
+</p:sld>
+</file>
+
+<file path=ppt/slides/slide10.xml><?xml version="1.0" encoding="utf-8"?>
+<p:sld xmlns:a="http://schemas.openxmlformats.org/drawingml/2006/main" xmlns:r="http://schemas.openxmlformats.org/officeDocument/2006/relationships" xmlns:p="http://schemas.openxmlformats.org/presentationml/2006/main">
+  <p:cSld>
+    <p:spTree>
+      <p:nvGrpSpPr>
+        <p:cNvPr id="1" name=""/>
+        <p:cNvGrpSpPr/>
+        <p:nvPr/>
+      </p:nvGrpSpPr>
+      <p:grpSpPr>
+        <a:xfrm>
+          <a:off x="0" y="0"/>
+          <a:ext cx="0" cy="0"/>
+          <a:chOff x="0" y="0"/>
+          <a:chExt cx="0" cy="0"/>
+        </a:xfrm>
+      </p:grpSpPr>
+      <p:sp>
+        <p:nvSpPr>
+          <p:cNvPr id="2" name="Título 1"/>
+          <p:cNvSpPr>
+            <a:spLocks noGrp="1"/>
+          </p:cNvSpPr>
+          <p:nvPr>
+            <p:ph type="title"/>
+          </p:nvPr>
+        </p:nvSpPr>
+        <p:spPr/>
+        <p:txBody>
+          <a:bodyPr>
+            <a:normAutofit fontScale="90000"/>
+          </a:bodyPr>
+          <a:lstStyle/>
+          <a:p>
+            <a:r>
+              <a:rPr lang="pt-BR" dirty="0" smtClean="0"/>
+              <a:t>FLUXOGRAMA –BPM BASEADO NO SIPOC </a:t>
+            </a:r>
+            <a:endParaRPr lang="en-US" dirty="0"/>
+          </a:p>
+        </p:txBody>
+      </p:sp>
+      <p:pic>
+        <p:nvPicPr>
+          <p:cNvPr id="4" name="Espaço Reservado para Conteúdo 3"/>
+          <p:cNvPicPr>
+            <a:picLocks noGrp="1" noChangeAspect="1"/>
+          </p:cNvPicPr>
+          <p:nvPr>
+            <p:ph idx="1"/>
+          </p:nvPr>
+        </p:nvPicPr>
+        <p:blipFill>
+          <a:blip r:embed="rId2" cstate="print">
+            <a:extLst>
+              <a:ext uri="{28A0092B-C50C-407E-A947-70E740481C1C}">
+                <a14:useLocalDpi xmlns:a14="http://schemas.microsoft.com/office/drawing/2010/main" val="0"/>
+              </a:ext>
+            </a:extLst>
+          </a:blip>
+          <a:stretch>
+            <a:fillRect/>
+          </a:stretch>
+        </p:blipFill>
+        <p:spPr>
+          <a:xfrm>
+            <a:off x="147469" y="1844824"/>
+            <a:ext cx="8793951" cy="2592288"/>
+          </a:xfrm>
+        </p:spPr>
+      </p:pic>
+      <p:sp>
+        <p:nvSpPr>
+          <p:cNvPr id="5" name="CaixaDeTexto 4"/>
+          <p:cNvSpPr txBox="1"/>
+          <p:nvPr/>
+        </p:nvSpPr>
+        <p:spPr>
+          <a:xfrm>
+            <a:off x="467544" y="4869160"/>
+            <a:ext cx="7560840" cy="923330"/>
+          </a:xfrm>
+          <a:prstGeom prst="rect">
+            <a:avLst/>
+          </a:prstGeom>
+          <a:noFill/>
+        </p:spPr>
+        <p:txBody>
+          <a:bodyPr wrap="square" rtlCol="0">
+            <a:spAutoFit/>
+          </a:bodyPr>
+          <a:lstStyle/>
+          <a:p>
+            <a:r>
+              <a:rPr lang="en-US" dirty="0" err="1" smtClean="0"/>
+              <a:t>Após</a:t>
+            </a:r>
+            <a:r>
+              <a:rPr lang="en-US" dirty="0" smtClean="0"/>
+              <a:t> </a:t>
+            </a:r>
+            <a:r>
+              <a:rPr lang="en-US" dirty="0" err="1" smtClean="0"/>
+              <a:t>realizar</a:t>
+            </a:r>
+            <a:r>
+              <a:rPr lang="en-US" dirty="0" smtClean="0"/>
+              <a:t> o download do </a:t>
+            </a:r>
+            <a:r>
+              <a:rPr lang="en-US" dirty="0" err="1" smtClean="0"/>
+              <a:t>aplicativo</a:t>
+            </a:r>
+            <a:r>
+              <a:rPr lang="en-US" dirty="0" smtClean="0"/>
+              <a:t> </a:t>
+            </a:r>
+            <a:r>
+              <a:rPr lang="en-US" dirty="0" err="1" smtClean="0"/>
+              <a:t>poderá</a:t>
+            </a:r>
+            <a:r>
+              <a:rPr lang="en-US" dirty="0" smtClean="0"/>
+              <a:t> </a:t>
+            </a:r>
+            <a:r>
+              <a:rPr lang="en-US" dirty="0" err="1" smtClean="0"/>
+              <a:t>ser</a:t>
+            </a:r>
+            <a:r>
+              <a:rPr lang="en-US" dirty="0" smtClean="0"/>
+              <a:t> </a:t>
+            </a:r>
+            <a:r>
+              <a:rPr lang="en-US" dirty="0" err="1" smtClean="0"/>
+              <a:t>aberto</a:t>
+            </a:r>
+            <a:r>
+              <a:rPr lang="en-US" dirty="0" smtClean="0"/>
+              <a:t> o </a:t>
+            </a:r>
+            <a:r>
+              <a:rPr lang="en-US" dirty="0" err="1" smtClean="0"/>
+              <a:t>arquivo</a:t>
+            </a:r>
+            <a:r>
+              <a:rPr lang="en-US" dirty="0"/>
+              <a:t> </a:t>
+            </a:r>
+            <a:r>
+              <a:rPr lang="en-US" dirty="0" err="1" smtClean="0"/>
+              <a:t>MapeamentodeProcessos_ToBe_SIPOC.bpmn</a:t>
+            </a:r>
+            <a:r>
+              <a:rPr lang="en-US" dirty="0" smtClean="0"/>
+              <a:t> para </a:t>
+            </a:r>
+            <a:r>
+              <a:rPr lang="en-US" dirty="0" err="1" smtClean="0"/>
+              <a:t>edição</a:t>
+            </a:r>
+            <a:r>
+              <a:rPr lang="en-US" dirty="0" smtClean="0"/>
+              <a:t> do </a:t>
+            </a:r>
+            <a:r>
+              <a:rPr lang="en-US" dirty="0" err="1" smtClean="0"/>
+              <a:t>modelo</a:t>
+            </a:r>
+            <a:r>
+              <a:rPr lang="en-US" dirty="0" smtClean="0"/>
+              <a:t> do </a:t>
+            </a:r>
+            <a:r>
+              <a:rPr lang="en-US" dirty="0" err="1" smtClean="0"/>
+              <a:t>fluxograma</a:t>
+            </a:r>
+            <a:endParaRPr lang="en-US" dirty="0"/>
+          </a:p>
+        </p:txBody>
+      </p:sp>
+    </p:spTree>
+    <p:extLst>
+      <p:ext uri="{BB962C8B-B14F-4D97-AF65-F5344CB8AC3E}">
+        <p14:creationId xmlns:p14="http://schemas.microsoft.com/office/powerpoint/2010/main" val="91929680"/>
+      </p:ext>
+    </p:extLst>
+  </p:cSld>
+  <p:clrMapOvr>
+    <a:masterClrMapping/>
+  </p:clrMapOvr>
+  <p:timing>
+    <p:tnLst>
+      <p:par>
+        <p:cTn id="1" dur="indefinite" restart="never" nodeType="tmRoot"/>
+      </p:par>
+    </p:tnLst>
+  </p:timing>
+</p:sld>
+</file>
+
+<file path=ppt/slides/slide11.xml><?xml version="1.0" encoding="utf-8"?>
+<p:sld xmlns:a="http://schemas.openxmlformats.org/drawingml/2006/main" xmlns:r="http://schemas.openxmlformats.org/officeDocument/2006/relationships" xmlns:p="http://schemas.openxmlformats.org/presentationml/2006/main">
+  <p:cSld>
+    <p:spTree>
+      <p:nvGrpSpPr>
+        <p:cNvPr id="1" name=""/>
+        <p:cNvGrpSpPr/>
+        <p:nvPr/>
+      </p:nvGrpSpPr>
+      <p:grpSpPr>
+        <a:xfrm>
+          <a:off x="0" y="0"/>
+          <a:ext cx="0" cy="0"/>
+          <a:chOff x="0" y="0"/>
+          <a:chExt cx="0" cy="0"/>
+        </a:xfrm>
+      </p:grpSpPr>
+      <p:sp>
+        <p:nvSpPr>
+          <p:cNvPr id="2" name="Título 1"/>
+          <p:cNvSpPr>
+            <a:spLocks noGrp="1"/>
+          </p:cNvSpPr>
+          <p:nvPr>
+            <p:ph type="title"/>
+          </p:nvPr>
+        </p:nvSpPr>
+        <p:spPr/>
+        <p:txBody>
+          <a:bodyPr>
+            <a:normAutofit fontScale="90000"/>
+          </a:bodyPr>
+          <a:lstStyle/>
+          <a:p>
+            <a:r>
+              <a:rPr lang="pt-BR" dirty="0" smtClean="0"/>
+              <a:t>OBSERVAÇÕES PARA BRAINSTORM DE CAUSAS RAIZ NA FASE DE MEDIR.</a:t>
+            </a:r>
+            <a:endParaRPr lang="en-US" dirty="0"/>
+          </a:p>
+        </p:txBody>
+      </p:sp>
+      <p:sp>
+        <p:nvSpPr>
+          <p:cNvPr id="3" name="Espaço Reservado para Conteúdo 2"/>
+          <p:cNvSpPr>
+            <a:spLocks noGrp="1"/>
+          </p:cNvSpPr>
+          <p:nvPr>
+            <p:ph idx="1"/>
+          </p:nvPr>
+        </p:nvSpPr>
+        <p:spPr/>
+        <p:txBody>
+          <a:bodyPr/>
+          <a:lstStyle/>
+          <a:p>
+            <a:r>
+              <a:rPr lang="pt-BR" dirty="0" smtClean="0"/>
+              <a:t>Padrão do Workflow muitas vezes segue caminhos </a:t>
+            </a:r>
+            <a:r>
+              <a:rPr lang="pt-BR" dirty="0" smtClean="0"/>
+              <a:t>diferentes </a:t>
+            </a:r>
+            <a:r>
+              <a:rPr lang="pt-BR" dirty="0" smtClean="0"/>
+              <a:t>do </a:t>
+            </a:r>
+            <a:r>
+              <a:rPr lang="pt-BR" dirty="0" smtClean="0"/>
+              <a:t>SIPOC( ver lead time estratificado slide 8 e 9 e fluxograma 10);</a:t>
+            </a:r>
+            <a:endParaRPr lang="pt-BR" dirty="0" smtClean="0"/>
+          </a:p>
+          <a:p>
+            <a:r>
+              <a:rPr lang="pt-BR" dirty="0" smtClean="0"/>
+              <a:t>Identificados alguns gargalos por motivos não muito definidos(</a:t>
+            </a:r>
+            <a:r>
+              <a:rPr lang="pt-BR" dirty="0" err="1" smtClean="0"/>
+              <a:t>Ex</a:t>
+            </a:r>
+            <a:r>
+              <a:rPr lang="pt-BR" dirty="0" smtClean="0"/>
+              <a:t>: Aguardando </a:t>
+            </a:r>
+            <a:r>
+              <a:rPr lang="pt-BR" dirty="0" smtClean="0"/>
+              <a:t>Emissão, Aprovação);</a:t>
+            </a:r>
+          </a:p>
+          <a:p>
+            <a:r>
+              <a:rPr lang="pt-BR" dirty="0" smtClean="0"/>
+              <a:t>Muitos retornos para etapas anteriores.(Loops);</a:t>
+            </a:r>
+            <a:endParaRPr lang="pt-BR" dirty="0" smtClean="0"/>
+          </a:p>
+        </p:txBody>
+      </p:sp>
+    </p:spTree>
+    <p:extLst>
+      <p:ext uri="{BB962C8B-B14F-4D97-AF65-F5344CB8AC3E}">
+        <p14:creationId xmlns:p14="http://schemas.microsoft.com/office/powerpoint/2010/main" val="3933182084"/>
       </p:ext>
     </p:extLst>
   </p:cSld>
@@ -3637,7 +4681,6 @@
                         <a:rPr lang="pt-BR" dirty="0" smtClean="0"/>
                         <a:t>Média Secretaria de Gestão de Serviços e Contratações</a:t>
                       </a:r>
-                      <a:endParaRPr lang="pt-BR" dirty="0" smtClean="0"/>
                     </a:p>
                   </a:txBody>
                   <a:tcPr/>
@@ -3667,7 +4710,6 @@
                         <a:rPr lang="pt-BR" dirty="0" smtClean="0"/>
                         <a:t>MÉDIA  GERAL </a:t>
                       </a:r>
-                      <a:endParaRPr lang="pt-BR" dirty="0" smtClean="0"/>
                     </a:p>
                   </a:txBody>
                   <a:tcPr/>
@@ -4407,6 +5449,13 @@
   <p:clrMapOvr>
     <a:masterClrMapping/>
   </p:clrMapOvr>
+  <p:timing>
+    <p:tnLst>
+      <p:par>
+        <p:cTn id="1" dur="indefinite" restart="never" nodeType="tmRoot"/>
+      </p:par>
+    </p:tnLst>
+  </p:timing>
 </p:sld>
 </file>
 
@@ -4440,10 +5489,2805 @@
         <p:spPr/>
         <p:txBody>
           <a:bodyPr>
-            <a:normAutofit/>
+            <a:normAutofit fontScale="90000"/>
           </a:bodyPr>
           <a:lstStyle/>
           <a:p>
+            <a:r>
+              <a:rPr lang="pt-BR" dirty="0" smtClean="0"/>
+              <a:t>LEAD TIME ESTRATIFICADOS POR ÁREA</a:t>
+            </a:r>
+            <a:endParaRPr lang="en-US" dirty="0"/>
+          </a:p>
+        </p:txBody>
+      </p:sp>
+      <p:graphicFrame>
+        <p:nvGraphicFramePr>
+          <p:cNvPr id="6" name="Espaço Reservado para Conteúdo 5"/>
+          <p:cNvGraphicFramePr>
+            <a:graphicFrameLocks noGrp="1"/>
+          </p:cNvGraphicFramePr>
+          <p:nvPr>
+            <p:ph idx="1"/>
+            <p:extLst>
+              <p:ext uri="{D42A27DB-BD31-4B8C-83A1-F6EECF244321}">
+                <p14:modId xmlns:p14="http://schemas.microsoft.com/office/powerpoint/2010/main" val="934529871"/>
+              </p:ext>
+            </p:extLst>
+          </p:nvPr>
+        </p:nvGraphicFramePr>
+        <p:xfrm>
+          <a:off x="323528" y="1772816"/>
+          <a:ext cx="1219200" cy="2667000"/>
+        </p:xfrm>
+        <a:graphic>
+          <a:graphicData uri="http://schemas.openxmlformats.org/drawingml/2006/table">
+            <a:tbl>
+              <a:tblPr/>
+              <a:tblGrid>
+                <a:gridCol w="609600"/>
+                <a:gridCol w="609600"/>
+              </a:tblGrid>
+              <a:tr h="133350">
+                <a:tc gridSpan="2">
+                  <a:txBody>
+                    <a:bodyPr/>
+                    <a:lstStyle/>
+                    <a:p>
+                      <a:pPr algn="l" fontAlgn="b"/>
+                      <a:r>
+                        <a:rPr lang="en-US" sz="800" b="1" i="0" u="none" strike="noStrike">
+                          <a:solidFill>
+                            <a:srgbClr val="000000"/>
+                          </a:solidFill>
+                          <a:effectLst/>
+                          <a:latin typeface="Verdana"/>
+                        </a:rPr>
+                        <a:t>DADOS AGRUPADOS:</a:t>
+                      </a:r>
+                    </a:p>
+                  </a:txBody>
+                  <a:tcPr marL="9525" marR="9525" marT="9525" marB="0" anchor="b">
+                    <a:lnL>
+                      <a:noFill/>
+                    </a:lnL>
+                    <a:lnR>
+                      <a:noFill/>
+                    </a:lnR>
+                    <a:lnT>
+                      <a:noFill/>
+                    </a:lnT>
+                    <a:lnB>
+                      <a:noFill/>
+                    </a:lnB>
+                  </a:tcPr>
+                </a:tc>
+                <a:tc hMerge="1">
+                  <a:txBody>
+                    <a:bodyPr/>
+                    <a:lstStyle/>
+                    <a:p>
+                      <a:endParaRPr lang="en-US"/>
+                    </a:p>
+                  </a:txBody>
+                  <a:tcPr/>
+                </a:tc>
+              </a:tr>
+              <a:tr h="133350">
+                <a:tc>
+                  <a:txBody>
+                    <a:bodyPr/>
+                    <a:lstStyle/>
+                    <a:p>
+                      <a:pPr algn="l" fontAlgn="b"/>
+                      <a:endParaRPr lang="en-US" sz="800" b="0" i="0" u="none" strike="noStrike">
+                        <a:solidFill>
+                          <a:srgbClr val="000000"/>
+                        </a:solidFill>
+                        <a:effectLst/>
+                        <a:latin typeface="Verdana"/>
+                      </a:endParaRPr>
+                    </a:p>
+                  </a:txBody>
+                  <a:tcPr marL="9525" marR="9525" marT="9525" marB="0" anchor="b">
+                    <a:lnL>
+                      <a:noFill/>
+                    </a:lnL>
+                    <a:lnR>
+                      <a:noFill/>
+                    </a:lnR>
+                    <a:lnT>
+                      <a:noFill/>
+                    </a:lnT>
+                    <a:lnB>
+                      <a:noFill/>
+                    </a:lnB>
+                  </a:tcPr>
+                </a:tc>
+                <a:tc>
+                  <a:txBody>
+                    <a:bodyPr/>
+                    <a:lstStyle/>
+                    <a:p>
+                      <a:pPr algn="l" fontAlgn="b"/>
+                      <a:endParaRPr lang="en-US" sz="800" b="0" i="0" u="none" strike="noStrike">
+                        <a:solidFill>
+                          <a:srgbClr val="000000"/>
+                        </a:solidFill>
+                        <a:effectLst/>
+                        <a:latin typeface="Verdana"/>
+                      </a:endParaRPr>
+                    </a:p>
+                  </a:txBody>
+                  <a:tcPr marL="9525" marR="9525" marT="9525" marB="0" anchor="b">
+                    <a:lnL>
+                      <a:noFill/>
+                    </a:lnL>
+                    <a:lnR>
+                      <a:noFill/>
+                    </a:lnR>
+                    <a:lnT>
+                      <a:noFill/>
+                    </a:lnT>
+                    <a:lnB>
+                      <a:noFill/>
+                    </a:lnB>
+                  </a:tcPr>
+                </a:tc>
+              </a:tr>
+              <a:tr h="133350">
+                <a:tc>
+                  <a:txBody>
+                    <a:bodyPr/>
+                    <a:lstStyle/>
+                    <a:p>
+                      <a:pPr algn="l" fontAlgn="b"/>
+                      <a:r>
+                        <a:rPr lang="en-US" sz="800" b="0" i="0" u="none" strike="noStrike">
+                          <a:solidFill>
+                            <a:srgbClr val="000000"/>
+                          </a:solidFill>
+                          <a:effectLst/>
+                          <a:latin typeface="Verdana"/>
+                        </a:rPr>
+                        <a:t>041ZE  </a:t>
+                      </a:r>
+                    </a:p>
+                  </a:txBody>
+                  <a:tcPr marL="9525" marR="9525" marT="9525" marB="0" anchor="b">
+                    <a:lnL>
+                      <a:noFill/>
+                    </a:lnL>
+                    <a:lnR>
+                      <a:noFill/>
+                    </a:lnR>
+                    <a:lnT>
+                      <a:noFill/>
+                    </a:lnT>
+                    <a:lnB>
+                      <a:noFill/>
+                    </a:lnB>
+                  </a:tcPr>
+                </a:tc>
+                <a:tc>
+                  <a:txBody>
+                    <a:bodyPr/>
+                    <a:lstStyle/>
+                    <a:p>
+                      <a:pPr algn="r" fontAlgn="b"/>
+                      <a:r>
+                        <a:rPr lang="en-US" sz="800" b="0" i="0" u="none" strike="noStrike">
+                          <a:solidFill>
+                            <a:srgbClr val="000000"/>
+                          </a:solidFill>
+                          <a:effectLst/>
+                          <a:latin typeface="Verdana"/>
+                        </a:rPr>
+                        <a:t>4</a:t>
+                      </a:r>
+                    </a:p>
+                  </a:txBody>
+                  <a:tcPr marL="9525" marR="9525" marT="9525" marB="0" anchor="b">
+                    <a:lnL>
+                      <a:noFill/>
+                    </a:lnL>
+                    <a:lnR>
+                      <a:noFill/>
+                    </a:lnR>
+                    <a:lnT>
+                      <a:noFill/>
+                    </a:lnT>
+                    <a:lnB>
+                      <a:noFill/>
+                    </a:lnB>
+                    <a:solidFill>
+                      <a:srgbClr val="FCEDF0"/>
+                    </a:solidFill>
+                  </a:tcPr>
+                </a:tc>
+              </a:tr>
+              <a:tr h="133350">
+                <a:tc>
+                  <a:txBody>
+                    <a:bodyPr/>
+                    <a:lstStyle/>
+                    <a:p>
+                      <a:pPr algn="l" fontAlgn="b"/>
+                      <a:r>
+                        <a:rPr lang="en-US" sz="800" b="0" i="0" u="none" strike="noStrike">
+                          <a:solidFill>
+                            <a:srgbClr val="000000"/>
+                          </a:solidFill>
+                          <a:effectLst/>
+                          <a:latin typeface="Verdana"/>
+                        </a:rPr>
+                        <a:t>DG  </a:t>
+                      </a:r>
+                    </a:p>
+                  </a:txBody>
+                  <a:tcPr marL="9525" marR="9525" marT="9525" marB="0" anchor="b">
+                    <a:lnL>
+                      <a:noFill/>
+                    </a:lnL>
+                    <a:lnR>
+                      <a:noFill/>
+                    </a:lnR>
+                    <a:lnT>
+                      <a:noFill/>
+                    </a:lnT>
+                    <a:lnB>
+                      <a:noFill/>
+                    </a:lnB>
+                  </a:tcPr>
+                </a:tc>
+                <a:tc>
+                  <a:txBody>
+                    <a:bodyPr/>
+                    <a:lstStyle/>
+                    <a:p>
+                      <a:pPr algn="r" fontAlgn="b"/>
+                      <a:r>
+                        <a:rPr lang="en-US" sz="800" b="0" i="0" u="none" strike="noStrike">
+                          <a:solidFill>
+                            <a:srgbClr val="000000"/>
+                          </a:solidFill>
+                          <a:effectLst/>
+                          <a:latin typeface="Verdana"/>
+                        </a:rPr>
+                        <a:t>3</a:t>
+                      </a:r>
+                    </a:p>
+                  </a:txBody>
+                  <a:tcPr marL="9525" marR="9525" marT="9525" marB="0" anchor="b">
+                    <a:lnL>
+                      <a:noFill/>
+                    </a:lnL>
+                    <a:lnR>
+                      <a:noFill/>
+                    </a:lnR>
+                    <a:lnT>
+                      <a:noFill/>
+                    </a:lnT>
+                    <a:lnB>
+                      <a:noFill/>
+                    </a:lnB>
+                    <a:solidFill>
+                      <a:srgbClr val="FCF2F5"/>
+                    </a:solidFill>
+                  </a:tcPr>
+                </a:tc>
+              </a:tr>
+              <a:tr h="133350">
+                <a:tc>
+                  <a:txBody>
+                    <a:bodyPr/>
+                    <a:lstStyle/>
+                    <a:p>
+                      <a:pPr algn="l" fontAlgn="b"/>
+                      <a:r>
+                        <a:rPr lang="en-US" sz="800" b="0" i="0" u="none" strike="noStrike">
+                          <a:solidFill>
+                            <a:srgbClr val="000000"/>
+                          </a:solidFill>
+                          <a:effectLst/>
+                          <a:latin typeface="Verdana"/>
+                        </a:rPr>
+                        <a:t>ASSISEG  </a:t>
+                      </a:r>
+                    </a:p>
+                  </a:txBody>
+                  <a:tcPr marL="9525" marR="9525" marT="9525" marB="0" anchor="b">
+                    <a:lnL>
+                      <a:noFill/>
+                    </a:lnL>
+                    <a:lnR>
+                      <a:noFill/>
+                    </a:lnR>
+                    <a:lnT>
+                      <a:noFill/>
+                    </a:lnT>
+                    <a:lnB>
+                      <a:noFill/>
+                    </a:lnB>
+                  </a:tcPr>
+                </a:tc>
+                <a:tc>
+                  <a:txBody>
+                    <a:bodyPr/>
+                    <a:lstStyle/>
+                    <a:p>
+                      <a:pPr algn="r" fontAlgn="b"/>
+                      <a:r>
+                        <a:rPr lang="en-US" sz="800" b="0" i="0" u="none" strike="noStrike">
+                          <a:solidFill>
+                            <a:srgbClr val="000000"/>
+                          </a:solidFill>
+                          <a:effectLst/>
+                          <a:latin typeface="Verdana"/>
+                        </a:rPr>
+                        <a:t>30</a:t>
+                      </a:r>
+                    </a:p>
+                  </a:txBody>
+                  <a:tcPr marL="9525" marR="9525" marT="9525" marB="0" anchor="b">
+                    <a:lnL>
+                      <a:noFill/>
+                    </a:lnL>
+                    <a:lnR>
+                      <a:noFill/>
+                    </a:lnR>
+                    <a:lnT>
+                      <a:noFill/>
+                    </a:lnT>
+                    <a:lnB>
+                      <a:noFill/>
+                    </a:lnB>
+                    <a:solidFill>
+                      <a:srgbClr val="F8696B"/>
+                    </a:solidFill>
+                  </a:tcPr>
+                </a:tc>
+              </a:tr>
+              <a:tr h="133350">
+                <a:tc>
+                  <a:txBody>
+                    <a:bodyPr/>
+                    <a:lstStyle/>
+                    <a:p>
+                      <a:pPr algn="l" fontAlgn="b"/>
+                      <a:r>
+                        <a:rPr lang="en-US" sz="800" b="0" i="0" u="none" strike="noStrike">
+                          <a:solidFill>
+                            <a:srgbClr val="000000"/>
+                          </a:solidFill>
+                          <a:effectLst/>
+                          <a:latin typeface="Verdana"/>
+                        </a:rPr>
+                        <a:t>CAA  </a:t>
+                      </a:r>
+                    </a:p>
+                  </a:txBody>
+                  <a:tcPr marL="9525" marR="9525" marT="9525" marB="0" anchor="b">
+                    <a:lnL>
+                      <a:noFill/>
+                    </a:lnL>
+                    <a:lnR>
+                      <a:noFill/>
+                    </a:lnR>
+                    <a:lnT>
+                      <a:noFill/>
+                    </a:lnT>
+                    <a:lnB>
+                      <a:noFill/>
+                    </a:lnB>
+                  </a:tcPr>
+                </a:tc>
+                <a:tc>
+                  <a:txBody>
+                    <a:bodyPr/>
+                    <a:lstStyle/>
+                    <a:p>
+                      <a:pPr algn="r" fontAlgn="b"/>
+                      <a:r>
+                        <a:rPr lang="en-US" sz="800" b="0" i="0" u="none" strike="noStrike">
+                          <a:solidFill>
+                            <a:srgbClr val="000000"/>
+                          </a:solidFill>
+                          <a:effectLst/>
+                          <a:latin typeface="Verdana"/>
+                        </a:rPr>
+                        <a:t>9</a:t>
+                      </a:r>
+                    </a:p>
+                  </a:txBody>
+                  <a:tcPr marL="9525" marR="9525" marT="9525" marB="0" anchor="b">
+                    <a:lnL>
+                      <a:noFill/>
+                    </a:lnL>
+                    <a:lnR>
+                      <a:noFill/>
+                    </a:lnR>
+                    <a:lnT>
+                      <a:noFill/>
+                    </a:lnT>
+                    <a:lnB>
+                      <a:noFill/>
+                    </a:lnB>
+                    <a:solidFill>
+                      <a:srgbClr val="FBD4D7"/>
+                    </a:solidFill>
+                  </a:tcPr>
+                </a:tc>
+              </a:tr>
+              <a:tr h="133350">
+                <a:tc>
+                  <a:txBody>
+                    <a:bodyPr/>
+                    <a:lstStyle/>
+                    <a:p>
+                      <a:pPr algn="l" fontAlgn="b"/>
+                      <a:r>
+                        <a:rPr lang="en-US" sz="800" b="0" i="0" u="none" strike="noStrike">
+                          <a:solidFill>
+                            <a:srgbClr val="000000"/>
+                          </a:solidFill>
+                          <a:effectLst/>
+                          <a:latin typeface="Verdana"/>
+                        </a:rPr>
+                        <a:t>SECADM  </a:t>
+                      </a:r>
+                    </a:p>
+                  </a:txBody>
+                  <a:tcPr marL="9525" marR="9525" marT="9525" marB="0" anchor="b">
+                    <a:lnL>
+                      <a:noFill/>
+                    </a:lnL>
+                    <a:lnR>
+                      <a:noFill/>
+                    </a:lnR>
+                    <a:lnT>
+                      <a:noFill/>
+                    </a:lnT>
+                    <a:lnB>
+                      <a:noFill/>
+                    </a:lnB>
+                  </a:tcPr>
+                </a:tc>
+                <a:tc>
+                  <a:txBody>
+                    <a:bodyPr/>
+                    <a:lstStyle/>
+                    <a:p>
+                      <a:pPr algn="r" fontAlgn="b"/>
+                      <a:r>
+                        <a:rPr lang="en-US" sz="800" b="0" i="0" u="none" strike="noStrike">
+                          <a:solidFill>
+                            <a:srgbClr val="000000"/>
+                          </a:solidFill>
+                          <a:effectLst/>
+                          <a:latin typeface="Verdana"/>
+                        </a:rPr>
+                        <a:t>4</a:t>
+                      </a:r>
+                    </a:p>
+                  </a:txBody>
+                  <a:tcPr marL="9525" marR="9525" marT="9525" marB="0" anchor="b">
+                    <a:lnL>
+                      <a:noFill/>
+                    </a:lnL>
+                    <a:lnR>
+                      <a:noFill/>
+                    </a:lnR>
+                    <a:lnT>
+                      <a:noFill/>
+                    </a:lnT>
+                    <a:lnB>
+                      <a:noFill/>
+                    </a:lnB>
+                    <a:solidFill>
+                      <a:srgbClr val="FCEDF0"/>
+                    </a:solidFill>
+                  </a:tcPr>
+                </a:tc>
+              </a:tr>
+              <a:tr h="133350">
+                <a:tc>
+                  <a:txBody>
+                    <a:bodyPr/>
+                    <a:lstStyle/>
+                    <a:p>
+                      <a:pPr algn="l" fontAlgn="b"/>
+                      <a:r>
+                        <a:rPr lang="en-US" sz="800" b="0" i="0" u="none" strike="noStrike">
+                          <a:solidFill>
+                            <a:srgbClr val="000000"/>
+                          </a:solidFill>
+                          <a:effectLst/>
+                          <a:latin typeface="Verdana"/>
+                        </a:rPr>
+                        <a:t> SPO  </a:t>
+                      </a:r>
+                    </a:p>
+                  </a:txBody>
+                  <a:tcPr marL="9525" marR="9525" marT="9525" marB="0" anchor="b">
+                    <a:lnL>
+                      <a:noFill/>
+                    </a:lnL>
+                    <a:lnR>
+                      <a:noFill/>
+                    </a:lnR>
+                    <a:lnT>
+                      <a:noFill/>
+                    </a:lnT>
+                    <a:lnB>
+                      <a:noFill/>
+                    </a:lnB>
+                  </a:tcPr>
+                </a:tc>
+                <a:tc>
+                  <a:txBody>
+                    <a:bodyPr/>
+                    <a:lstStyle/>
+                    <a:p>
+                      <a:pPr algn="r" fontAlgn="b"/>
+                      <a:r>
+                        <a:rPr lang="en-US" sz="800" b="0" i="0" u="none" strike="noStrike">
+                          <a:solidFill>
+                            <a:srgbClr val="000000"/>
+                          </a:solidFill>
+                          <a:effectLst/>
+                          <a:latin typeface="Verdana"/>
+                        </a:rPr>
+                        <a:t>1</a:t>
+                      </a:r>
+                    </a:p>
+                  </a:txBody>
+                  <a:tcPr marL="9525" marR="9525" marT="9525" marB="0" anchor="b">
+                    <a:lnL>
+                      <a:noFill/>
+                    </a:lnL>
+                    <a:lnR>
+                      <a:noFill/>
+                    </a:lnR>
+                    <a:lnT>
+                      <a:noFill/>
+                    </a:lnT>
+                    <a:lnB>
+                      <a:noFill/>
+                    </a:lnB>
+                    <a:solidFill>
+                      <a:srgbClr val="FCFCFF"/>
+                    </a:solidFill>
+                  </a:tcPr>
+                </a:tc>
+              </a:tr>
+              <a:tr h="133350">
+                <a:tc>
+                  <a:txBody>
+                    <a:bodyPr/>
+                    <a:lstStyle/>
+                    <a:p>
+                      <a:pPr algn="l" fontAlgn="b"/>
+                      <a:r>
+                        <a:rPr lang="en-US" sz="800" b="0" i="0" u="none" strike="noStrike">
+                          <a:solidFill>
+                            <a:srgbClr val="000000"/>
+                          </a:solidFill>
+                          <a:effectLst/>
+                          <a:latin typeface="Verdana"/>
+                        </a:rPr>
+                        <a:t> CO  </a:t>
+                      </a:r>
+                    </a:p>
+                  </a:txBody>
+                  <a:tcPr marL="9525" marR="9525" marT="9525" marB="0" anchor="b">
+                    <a:lnL>
+                      <a:noFill/>
+                    </a:lnL>
+                    <a:lnR>
+                      <a:noFill/>
+                    </a:lnR>
+                    <a:lnT>
+                      <a:noFill/>
+                    </a:lnT>
+                    <a:lnB>
+                      <a:noFill/>
+                    </a:lnB>
+                  </a:tcPr>
+                </a:tc>
+                <a:tc>
+                  <a:txBody>
+                    <a:bodyPr/>
+                    <a:lstStyle/>
+                    <a:p>
+                      <a:pPr algn="r" fontAlgn="b"/>
+                      <a:r>
+                        <a:rPr lang="en-US" sz="800" b="0" i="0" u="none" strike="noStrike">
+                          <a:solidFill>
+                            <a:srgbClr val="000000"/>
+                          </a:solidFill>
+                          <a:effectLst/>
+                          <a:latin typeface="Verdana"/>
+                        </a:rPr>
+                        <a:t>1</a:t>
+                      </a:r>
+                    </a:p>
+                  </a:txBody>
+                  <a:tcPr marL="9525" marR="9525" marT="9525" marB="0" anchor="b">
+                    <a:lnL>
+                      <a:noFill/>
+                    </a:lnL>
+                    <a:lnR>
+                      <a:noFill/>
+                    </a:lnR>
+                    <a:lnT>
+                      <a:noFill/>
+                    </a:lnT>
+                    <a:lnB>
+                      <a:noFill/>
+                    </a:lnB>
+                    <a:solidFill>
+                      <a:srgbClr val="FCFCFF"/>
+                    </a:solidFill>
+                  </a:tcPr>
+                </a:tc>
+              </a:tr>
+              <a:tr h="133350">
+                <a:tc>
+                  <a:txBody>
+                    <a:bodyPr/>
+                    <a:lstStyle/>
+                    <a:p>
+                      <a:pPr algn="l" fontAlgn="b"/>
+                      <a:r>
+                        <a:rPr lang="en-US" sz="800" b="0" i="0" u="none" strike="noStrike">
+                          <a:solidFill>
+                            <a:srgbClr val="000000"/>
+                          </a:solidFill>
+                          <a:effectLst/>
+                          <a:latin typeface="Verdana"/>
+                        </a:rPr>
+                        <a:t>SECOFC  </a:t>
+                      </a:r>
+                    </a:p>
+                  </a:txBody>
+                  <a:tcPr marL="9525" marR="9525" marT="9525" marB="0" anchor="b">
+                    <a:lnL>
+                      <a:noFill/>
+                    </a:lnL>
+                    <a:lnR>
+                      <a:noFill/>
+                    </a:lnR>
+                    <a:lnT>
+                      <a:noFill/>
+                    </a:lnT>
+                    <a:lnB>
+                      <a:noFill/>
+                    </a:lnB>
+                  </a:tcPr>
+                </a:tc>
+                <a:tc>
+                  <a:txBody>
+                    <a:bodyPr/>
+                    <a:lstStyle/>
+                    <a:p>
+                      <a:pPr algn="r" fontAlgn="b"/>
+                      <a:r>
+                        <a:rPr lang="en-US" sz="800" b="0" i="0" u="none" strike="noStrike">
+                          <a:solidFill>
+                            <a:srgbClr val="000000"/>
+                          </a:solidFill>
+                          <a:effectLst/>
+                          <a:latin typeface="Verdana"/>
+                        </a:rPr>
+                        <a:t>3</a:t>
+                      </a:r>
+                    </a:p>
+                  </a:txBody>
+                  <a:tcPr marL="9525" marR="9525" marT="9525" marB="0" anchor="b">
+                    <a:lnL>
+                      <a:noFill/>
+                    </a:lnL>
+                    <a:lnR>
+                      <a:noFill/>
+                    </a:lnR>
+                    <a:lnT>
+                      <a:noFill/>
+                    </a:lnT>
+                    <a:lnB>
+                      <a:noFill/>
+                    </a:lnB>
+                    <a:solidFill>
+                      <a:srgbClr val="FCF2F5"/>
+                    </a:solidFill>
+                  </a:tcPr>
+                </a:tc>
+              </a:tr>
+              <a:tr h="133350">
+                <a:tc>
+                  <a:txBody>
+                    <a:bodyPr/>
+                    <a:lstStyle/>
+                    <a:p>
+                      <a:pPr algn="l" fontAlgn="b"/>
+                      <a:r>
+                        <a:rPr lang="en-US" sz="800" b="0" i="0" u="none" strike="noStrike">
+                          <a:solidFill>
+                            <a:srgbClr val="000000"/>
+                          </a:solidFill>
+                          <a:effectLst/>
+                          <a:latin typeface="Verdana"/>
+                        </a:rPr>
+                        <a:t>CLC  </a:t>
+                      </a:r>
+                    </a:p>
+                  </a:txBody>
+                  <a:tcPr marL="9525" marR="9525" marT="9525" marB="0" anchor="b">
+                    <a:lnL>
+                      <a:noFill/>
+                    </a:lnL>
+                    <a:lnR>
+                      <a:noFill/>
+                    </a:lnR>
+                    <a:lnT>
+                      <a:noFill/>
+                    </a:lnT>
+                    <a:lnB>
+                      <a:noFill/>
+                    </a:lnB>
+                  </a:tcPr>
+                </a:tc>
+                <a:tc>
+                  <a:txBody>
+                    <a:bodyPr/>
+                    <a:lstStyle/>
+                    <a:p>
+                      <a:pPr algn="r" fontAlgn="b"/>
+                      <a:r>
+                        <a:rPr lang="en-US" sz="800" b="0" i="0" u="none" strike="noStrike">
+                          <a:solidFill>
+                            <a:srgbClr val="000000"/>
+                          </a:solidFill>
+                          <a:effectLst/>
+                          <a:latin typeface="Verdana"/>
+                        </a:rPr>
+                        <a:t>7</a:t>
+                      </a:r>
+                    </a:p>
+                  </a:txBody>
+                  <a:tcPr marL="9525" marR="9525" marT="9525" marB="0" anchor="b">
+                    <a:lnL>
+                      <a:noFill/>
+                    </a:lnL>
+                    <a:lnR>
+                      <a:noFill/>
+                    </a:lnR>
+                    <a:lnT>
+                      <a:noFill/>
+                    </a:lnT>
+                    <a:lnB>
+                      <a:noFill/>
+                    </a:lnB>
+                    <a:solidFill>
+                      <a:srgbClr val="FCDEE1"/>
+                    </a:solidFill>
+                  </a:tcPr>
+                </a:tc>
+              </a:tr>
+              <a:tr h="133350">
+                <a:tc>
+                  <a:txBody>
+                    <a:bodyPr/>
+                    <a:lstStyle/>
+                    <a:p>
+                      <a:pPr algn="l" fontAlgn="b"/>
+                      <a:r>
+                        <a:rPr lang="en-US" sz="800" b="0" i="0" u="none" strike="noStrike">
+                          <a:solidFill>
+                            <a:srgbClr val="000000"/>
+                          </a:solidFill>
+                          <a:effectLst/>
+                          <a:latin typeface="Verdana"/>
+                        </a:rPr>
+                        <a:t>SC  </a:t>
+                      </a:r>
+                    </a:p>
+                  </a:txBody>
+                  <a:tcPr marL="9525" marR="9525" marT="9525" marB="0" anchor="b">
+                    <a:lnL>
+                      <a:noFill/>
+                    </a:lnL>
+                    <a:lnR>
+                      <a:noFill/>
+                    </a:lnR>
+                    <a:lnT>
+                      <a:noFill/>
+                    </a:lnT>
+                    <a:lnB>
+                      <a:noFill/>
+                    </a:lnB>
+                  </a:tcPr>
+                </a:tc>
+                <a:tc>
+                  <a:txBody>
+                    <a:bodyPr/>
+                    <a:lstStyle/>
+                    <a:p>
+                      <a:pPr algn="r" fontAlgn="b"/>
+                      <a:r>
+                        <a:rPr lang="en-US" sz="800" b="0" i="0" u="none" strike="noStrike">
+                          <a:solidFill>
+                            <a:srgbClr val="000000"/>
+                          </a:solidFill>
+                          <a:effectLst/>
+                          <a:latin typeface="Verdana"/>
+                        </a:rPr>
+                        <a:t>17</a:t>
+                      </a:r>
+                    </a:p>
+                  </a:txBody>
+                  <a:tcPr marL="9525" marR="9525" marT="9525" marB="0" anchor="b">
+                    <a:lnL>
+                      <a:noFill/>
+                    </a:lnL>
+                    <a:lnR>
+                      <a:noFill/>
+                    </a:lnR>
+                    <a:lnT>
+                      <a:noFill/>
+                    </a:lnT>
+                    <a:lnB>
+                      <a:noFill/>
+                    </a:lnB>
+                    <a:solidFill>
+                      <a:srgbClr val="FAABAE"/>
+                    </a:solidFill>
+                  </a:tcPr>
+                </a:tc>
+              </a:tr>
+              <a:tr h="133350">
+                <a:tc>
+                  <a:txBody>
+                    <a:bodyPr/>
+                    <a:lstStyle/>
+                    <a:p>
+                      <a:pPr algn="l" fontAlgn="b"/>
+                      <a:r>
+                        <a:rPr lang="en-US" sz="800" b="0" i="0" u="none" strike="noStrike">
+                          <a:solidFill>
+                            <a:srgbClr val="000000"/>
+                          </a:solidFill>
+                          <a:effectLst/>
+                          <a:latin typeface="Verdana"/>
+                        </a:rPr>
+                        <a:t>SCON  </a:t>
+                      </a:r>
+                    </a:p>
+                  </a:txBody>
+                  <a:tcPr marL="9525" marR="9525" marT="9525" marB="0" anchor="b">
+                    <a:lnL>
+                      <a:noFill/>
+                    </a:lnL>
+                    <a:lnR>
+                      <a:noFill/>
+                    </a:lnR>
+                    <a:lnT>
+                      <a:noFill/>
+                    </a:lnT>
+                    <a:lnB>
+                      <a:noFill/>
+                    </a:lnB>
+                  </a:tcPr>
+                </a:tc>
+                <a:tc>
+                  <a:txBody>
+                    <a:bodyPr/>
+                    <a:lstStyle/>
+                    <a:p>
+                      <a:pPr algn="r" fontAlgn="b"/>
+                      <a:r>
+                        <a:rPr lang="en-US" sz="800" b="0" i="0" u="none" strike="noStrike">
+                          <a:solidFill>
+                            <a:srgbClr val="000000"/>
+                          </a:solidFill>
+                          <a:effectLst/>
+                          <a:latin typeface="Verdana"/>
+                        </a:rPr>
+                        <a:t>18</a:t>
+                      </a:r>
+                    </a:p>
+                  </a:txBody>
+                  <a:tcPr marL="9525" marR="9525" marT="9525" marB="0" anchor="b">
+                    <a:lnL>
+                      <a:noFill/>
+                    </a:lnL>
+                    <a:lnR>
+                      <a:noFill/>
+                    </a:lnR>
+                    <a:lnT>
+                      <a:noFill/>
+                    </a:lnT>
+                    <a:lnB>
+                      <a:noFill/>
+                    </a:lnB>
+                    <a:solidFill>
+                      <a:srgbClr val="FAA6A9"/>
+                    </a:solidFill>
+                  </a:tcPr>
+                </a:tc>
+              </a:tr>
+              <a:tr h="133350">
+                <a:tc>
+                  <a:txBody>
+                    <a:bodyPr/>
+                    <a:lstStyle/>
+                    <a:p>
+                      <a:pPr algn="l" fontAlgn="b"/>
+                      <a:r>
+                        <a:rPr lang="en-US" sz="800" b="0" i="0" u="none" strike="noStrike">
+                          <a:solidFill>
+                            <a:srgbClr val="000000"/>
+                          </a:solidFill>
+                          <a:effectLst/>
+                          <a:latin typeface="Verdana"/>
+                        </a:rPr>
+                        <a:t>SECOFC  </a:t>
+                      </a:r>
+                    </a:p>
+                  </a:txBody>
+                  <a:tcPr marL="9525" marR="9525" marT="9525" marB="0" anchor="b">
+                    <a:lnL>
+                      <a:noFill/>
+                    </a:lnL>
+                    <a:lnR>
+                      <a:noFill/>
+                    </a:lnR>
+                    <a:lnT>
+                      <a:noFill/>
+                    </a:lnT>
+                    <a:lnB>
+                      <a:noFill/>
+                    </a:lnB>
+                  </a:tcPr>
+                </a:tc>
+                <a:tc>
+                  <a:txBody>
+                    <a:bodyPr/>
+                    <a:lstStyle/>
+                    <a:p>
+                      <a:pPr algn="r" fontAlgn="b"/>
+                      <a:r>
+                        <a:rPr lang="en-US" sz="800" b="0" i="0" u="none" strike="noStrike">
+                          <a:solidFill>
+                            <a:srgbClr val="000000"/>
+                          </a:solidFill>
+                          <a:effectLst/>
+                          <a:latin typeface="Verdana"/>
+                        </a:rPr>
+                        <a:t>3</a:t>
+                      </a:r>
+                    </a:p>
+                  </a:txBody>
+                  <a:tcPr marL="9525" marR="9525" marT="9525" marB="0" anchor="b">
+                    <a:lnL>
+                      <a:noFill/>
+                    </a:lnL>
+                    <a:lnR>
+                      <a:noFill/>
+                    </a:lnR>
+                    <a:lnT>
+                      <a:noFill/>
+                    </a:lnT>
+                    <a:lnB>
+                      <a:noFill/>
+                    </a:lnB>
+                    <a:solidFill>
+                      <a:srgbClr val="FCF2F5"/>
+                    </a:solidFill>
+                  </a:tcPr>
+                </a:tc>
+              </a:tr>
+              <a:tr h="133350">
+                <a:tc>
+                  <a:txBody>
+                    <a:bodyPr/>
+                    <a:lstStyle/>
+                    <a:p>
+                      <a:pPr algn="l" fontAlgn="b"/>
+                      <a:r>
+                        <a:rPr lang="en-US" sz="800" b="0" i="0" u="none" strike="noStrike">
+                          <a:solidFill>
+                            <a:srgbClr val="000000"/>
+                          </a:solidFill>
+                          <a:effectLst/>
+                          <a:latin typeface="Verdana"/>
+                        </a:rPr>
+                        <a:t>SPO  </a:t>
+                      </a:r>
+                    </a:p>
+                  </a:txBody>
+                  <a:tcPr marL="9525" marR="9525" marT="9525" marB="0" anchor="b">
+                    <a:lnL>
+                      <a:noFill/>
+                    </a:lnL>
+                    <a:lnR>
+                      <a:noFill/>
+                    </a:lnR>
+                    <a:lnT>
+                      <a:noFill/>
+                    </a:lnT>
+                    <a:lnB>
+                      <a:noFill/>
+                    </a:lnB>
+                  </a:tcPr>
+                </a:tc>
+                <a:tc>
+                  <a:txBody>
+                    <a:bodyPr/>
+                    <a:lstStyle/>
+                    <a:p>
+                      <a:pPr algn="r" fontAlgn="b"/>
+                      <a:r>
+                        <a:rPr lang="en-US" sz="800" b="0" i="0" u="none" strike="noStrike">
+                          <a:solidFill>
+                            <a:srgbClr val="000000"/>
+                          </a:solidFill>
+                          <a:effectLst/>
+                          <a:latin typeface="Verdana"/>
+                        </a:rPr>
+                        <a:t>1</a:t>
+                      </a:r>
+                    </a:p>
+                  </a:txBody>
+                  <a:tcPr marL="9525" marR="9525" marT="9525" marB="0" anchor="b">
+                    <a:lnL>
+                      <a:noFill/>
+                    </a:lnL>
+                    <a:lnR>
+                      <a:noFill/>
+                    </a:lnR>
+                    <a:lnT>
+                      <a:noFill/>
+                    </a:lnT>
+                    <a:lnB>
+                      <a:noFill/>
+                    </a:lnB>
+                    <a:solidFill>
+                      <a:srgbClr val="FCFCFF"/>
+                    </a:solidFill>
+                  </a:tcPr>
+                </a:tc>
+              </a:tr>
+              <a:tr h="133350">
+                <a:tc>
+                  <a:txBody>
+                    <a:bodyPr/>
+                    <a:lstStyle/>
+                    <a:p>
+                      <a:pPr algn="l" fontAlgn="b"/>
+                      <a:r>
+                        <a:rPr lang="en-US" sz="800" b="0" i="0" u="none" strike="noStrike">
+                          <a:solidFill>
+                            <a:srgbClr val="000000"/>
+                          </a:solidFill>
+                          <a:effectLst/>
+                          <a:latin typeface="Verdana"/>
+                        </a:rPr>
+                        <a:t>CO  </a:t>
+                      </a:r>
+                    </a:p>
+                  </a:txBody>
+                  <a:tcPr marL="9525" marR="9525" marT="9525" marB="0" anchor="b">
+                    <a:lnL>
+                      <a:noFill/>
+                    </a:lnL>
+                    <a:lnR>
+                      <a:noFill/>
+                    </a:lnR>
+                    <a:lnT>
+                      <a:noFill/>
+                    </a:lnT>
+                    <a:lnB>
+                      <a:noFill/>
+                    </a:lnB>
+                  </a:tcPr>
+                </a:tc>
+                <a:tc>
+                  <a:txBody>
+                    <a:bodyPr/>
+                    <a:lstStyle/>
+                    <a:p>
+                      <a:pPr algn="r" fontAlgn="b"/>
+                      <a:r>
+                        <a:rPr lang="en-US" sz="800" b="0" i="0" u="none" strike="noStrike">
+                          <a:solidFill>
+                            <a:srgbClr val="000000"/>
+                          </a:solidFill>
+                          <a:effectLst/>
+                          <a:latin typeface="Verdana"/>
+                        </a:rPr>
+                        <a:t>2</a:t>
+                      </a:r>
+                    </a:p>
+                  </a:txBody>
+                  <a:tcPr marL="9525" marR="9525" marT="9525" marB="0" anchor="b">
+                    <a:lnL>
+                      <a:noFill/>
+                    </a:lnL>
+                    <a:lnR>
+                      <a:noFill/>
+                    </a:lnR>
+                    <a:lnT>
+                      <a:noFill/>
+                    </a:lnT>
+                    <a:lnB>
+                      <a:noFill/>
+                    </a:lnB>
+                    <a:solidFill>
+                      <a:srgbClr val="FCF7FA"/>
+                    </a:solidFill>
+                  </a:tcPr>
+                </a:tc>
+              </a:tr>
+              <a:tr h="133350">
+                <a:tc>
+                  <a:txBody>
+                    <a:bodyPr/>
+                    <a:lstStyle/>
+                    <a:p>
+                      <a:pPr algn="l" fontAlgn="b"/>
+                      <a:r>
+                        <a:rPr lang="en-US" sz="800" b="0" i="0" u="none" strike="noStrike">
+                          <a:solidFill>
+                            <a:srgbClr val="000000"/>
+                          </a:solidFill>
+                          <a:effectLst/>
+                          <a:latin typeface="Verdana"/>
+                        </a:rPr>
+                        <a:t>CPL  </a:t>
+                      </a:r>
+                    </a:p>
+                  </a:txBody>
+                  <a:tcPr marL="9525" marR="9525" marT="9525" marB="0" anchor="b">
+                    <a:lnL>
+                      <a:noFill/>
+                    </a:lnL>
+                    <a:lnR>
+                      <a:noFill/>
+                    </a:lnR>
+                    <a:lnT>
+                      <a:noFill/>
+                    </a:lnT>
+                    <a:lnB>
+                      <a:noFill/>
+                    </a:lnB>
+                  </a:tcPr>
+                </a:tc>
+                <a:tc>
+                  <a:txBody>
+                    <a:bodyPr/>
+                    <a:lstStyle/>
+                    <a:p>
+                      <a:pPr algn="r" fontAlgn="b"/>
+                      <a:r>
+                        <a:rPr lang="en-US" sz="800" b="0" i="0" u="none" strike="noStrike">
+                          <a:solidFill>
+                            <a:srgbClr val="000000"/>
+                          </a:solidFill>
+                          <a:effectLst/>
+                          <a:latin typeface="Verdana"/>
+                        </a:rPr>
+                        <a:t>3</a:t>
+                      </a:r>
+                    </a:p>
+                  </a:txBody>
+                  <a:tcPr marL="9525" marR="9525" marT="9525" marB="0" anchor="b">
+                    <a:lnL>
+                      <a:noFill/>
+                    </a:lnL>
+                    <a:lnR>
+                      <a:noFill/>
+                    </a:lnR>
+                    <a:lnT>
+                      <a:noFill/>
+                    </a:lnT>
+                    <a:lnB>
+                      <a:noFill/>
+                    </a:lnB>
+                    <a:solidFill>
+                      <a:srgbClr val="FCF2F5"/>
+                    </a:solidFill>
+                  </a:tcPr>
+                </a:tc>
+              </a:tr>
+              <a:tr h="133350">
+                <a:tc>
+                  <a:txBody>
+                    <a:bodyPr/>
+                    <a:lstStyle/>
+                    <a:p>
+                      <a:pPr algn="l" fontAlgn="b"/>
+                      <a:r>
+                        <a:rPr lang="en-US" sz="800" b="0" i="0" u="none" strike="noStrike">
+                          <a:solidFill>
+                            <a:srgbClr val="000000"/>
+                          </a:solidFill>
+                          <a:effectLst/>
+                          <a:latin typeface="Verdana"/>
+                        </a:rPr>
+                        <a:t>ASSDG  </a:t>
+                      </a:r>
+                    </a:p>
+                  </a:txBody>
+                  <a:tcPr marL="9525" marR="9525" marT="9525" marB="0" anchor="b">
+                    <a:lnL>
+                      <a:noFill/>
+                    </a:lnL>
+                    <a:lnR>
+                      <a:noFill/>
+                    </a:lnR>
+                    <a:lnT>
+                      <a:noFill/>
+                    </a:lnT>
+                    <a:lnB>
+                      <a:noFill/>
+                    </a:lnB>
+                  </a:tcPr>
+                </a:tc>
+                <a:tc>
+                  <a:txBody>
+                    <a:bodyPr/>
+                    <a:lstStyle/>
+                    <a:p>
+                      <a:pPr algn="r" fontAlgn="b"/>
+                      <a:r>
+                        <a:rPr lang="en-US" sz="800" b="0" i="0" u="none" strike="noStrike">
+                          <a:solidFill>
+                            <a:srgbClr val="000000"/>
+                          </a:solidFill>
+                          <a:effectLst/>
+                          <a:latin typeface="Verdana"/>
+                        </a:rPr>
+                        <a:t>7</a:t>
+                      </a:r>
+                    </a:p>
+                  </a:txBody>
+                  <a:tcPr marL="9525" marR="9525" marT="9525" marB="0" anchor="b">
+                    <a:lnL>
+                      <a:noFill/>
+                    </a:lnL>
+                    <a:lnR>
+                      <a:noFill/>
+                    </a:lnR>
+                    <a:lnT>
+                      <a:noFill/>
+                    </a:lnT>
+                    <a:lnB>
+                      <a:noFill/>
+                    </a:lnB>
+                    <a:solidFill>
+                      <a:srgbClr val="FCDEE1"/>
+                    </a:solidFill>
+                  </a:tcPr>
+                </a:tc>
+              </a:tr>
+              <a:tr h="133350">
+                <a:tc>
+                  <a:txBody>
+                    <a:bodyPr/>
+                    <a:lstStyle/>
+                    <a:p>
+                      <a:pPr algn="l" fontAlgn="b"/>
+                      <a:r>
+                        <a:rPr lang="en-US" sz="800" b="0" i="0" u="none" strike="noStrike">
+                          <a:solidFill>
+                            <a:srgbClr val="000000"/>
+                          </a:solidFill>
+                          <a:effectLst/>
+                          <a:latin typeface="Verdana"/>
+                        </a:rPr>
+                        <a:t>ACO  </a:t>
+                      </a:r>
+                    </a:p>
+                  </a:txBody>
+                  <a:tcPr marL="9525" marR="9525" marT="9525" marB="0" anchor="b">
+                    <a:lnL>
+                      <a:noFill/>
+                    </a:lnL>
+                    <a:lnR>
+                      <a:noFill/>
+                    </a:lnR>
+                    <a:lnT>
+                      <a:noFill/>
+                    </a:lnT>
+                    <a:lnB>
+                      <a:noFill/>
+                    </a:lnB>
+                  </a:tcPr>
+                </a:tc>
+                <a:tc>
+                  <a:txBody>
+                    <a:bodyPr/>
+                    <a:lstStyle/>
+                    <a:p>
+                      <a:pPr algn="r" fontAlgn="b"/>
+                      <a:r>
+                        <a:rPr lang="en-US" sz="800" b="0" i="0" u="none" strike="noStrike">
+                          <a:solidFill>
+                            <a:srgbClr val="000000"/>
+                          </a:solidFill>
+                          <a:effectLst/>
+                          <a:latin typeface="Verdana"/>
+                        </a:rPr>
+                        <a:t>2</a:t>
+                      </a:r>
+                    </a:p>
+                  </a:txBody>
+                  <a:tcPr marL="9525" marR="9525" marT="9525" marB="0" anchor="b">
+                    <a:lnL>
+                      <a:noFill/>
+                    </a:lnL>
+                    <a:lnR>
+                      <a:noFill/>
+                    </a:lnR>
+                    <a:lnT>
+                      <a:noFill/>
+                    </a:lnT>
+                    <a:lnB>
+                      <a:noFill/>
+                    </a:lnB>
+                    <a:solidFill>
+                      <a:srgbClr val="FCF7FA"/>
+                    </a:solidFill>
+                  </a:tcPr>
+                </a:tc>
+              </a:tr>
+              <a:tr h="133350">
+                <a:tc>
+                  <a:txBody>
+                    <a:bodyPr/>
+                    <a:lstStyle/>
+                    <a:p>
+                      <a:pPr algn="l" fontAlgn="b"/>
+                      <a:r>
+                        <a:rPr lang="en-US" sz="800" b="0" i="0" u="none" strike="noStrike">
+                          <a:solidFill>
+                            <a:srgbClr val="000000"/>
+                          </a:solidFill>
+                          <a:effectLst/>
+                          <a:latin typeface="Verdana"/>
+                        </a:rPr>
+                        <a:t>SAEO  </a:t>
+                      </a:r>
+                    </a:p>
+                  </a:txBody>
+                  <a:tcPr marL="9525" marR="9525" marT="9525" marB="0" anchor="b">
+                    <a:lnL>
+                      <a:noFill/>
+                    </a:lnL>
+                    <a:lnR>
+                      <a:noFill/>
+                    </a:lnR>
+                    <a:lnT>
+                      <a:noFill/>
+                    </a:lnT>
+                    <a:lnB>
+                      <a:noFill/>
+                    </a:lnB>
+                  </a:tcPr>
+                </a:tc>
+                <a:tc>
+                  <a:txBody>
+                    <a:bodyPr/>
+                    <a:lstStyle/>
+                    <a:p>
+                      <a:pPr algn="r" fontAlgn="b"/>
+                      <a:r>
+                        <a:rPr lang="en-US" sz="800" b="0" i="0" u="none" strike="noStrike" dirty="0">
+                          <a:solidFill>
+                            <a:srgbClr val="000000"/>
+                          </a:solidFill>
+                          <a:effectLst/>
+                          <a:latin typeface="Verdana"/>
+                        </a:rPr>
+                        <a:t>1</a:t>
+                      </a:r>
+                    </a:p>
+                  </a:txBody>
+                  <a:tcPr marL="9525" marR="9525" marT="9525" marB="0" anchor="b">
+                    <a:lnL>
+                      <a:noFill/>
+                    </a:lnL>
+                    <a:lnR>
+                      <a:noFill/>
+                    </a:lnR>
+                    <a:lnT>
+                      <a:noFill/>
+                    </a:lnT>
+                    <a:lnB>
+                      <a:noFill/>
+                    </a:lnB>
+                    <a:solidFill>
+                      <a:srgbClr val="FCFCFF"/>
+                    </a:solidFill>
+                  </a:tcPr>
+                </a:tc>
+              </a:tr>
+            </a:tbl>
+          </a:graphicData>
+        </a:graphic>
+      </p:graphicFrame>
+      <p:graphicFrame>
+        <p:nvGraphicFramePr>
+          <p:cNvPr id="7" name="Chart 1"/>
+          <p:cNvGraphicFramePr>
+            <a:graphicFrameLocks/>
+          </p:cNvGraphicFramePr>
+          <p:nvPr>
+            <p:extLst>
+              <p:ext uri="{D42A27DB-BD31-4B8C-83A1-F6EECF244321}">
+                <p14:modId xmlns:p14="http://schemas.microsoft.com/office/powerpoint/2010/main" val="858195948"/>
+              </p:ext>
+            </p:extLst>
+          </p:nvPr>
+        </p:nvGraphicFramePr>
+        <p:xfrm>
+          <a:off x="1763688" y="1268760"/>
+          <a:ext cx="7243663" cy="4931568"/>
+        </p:xfrm>
+        <a:graphic>
+          <a:graphicData uri="http://schemas.openxmlformats.org/drawingml/2006/chart">
+            <c:chart xmlns:c="http://schemas.openxmlformats.org/drawingml/2006/chart" xmlns:r="http://schemas.openxmlformats.org/officeDocument/2006/relationships" r:id="rId2"/>
+          </a:graphicData>
+        </a:graphic>
+      </p:graphicFrame>
+    </p:spTree>
+    <p:extLst>
+      <p:ext uri="{BB962C8B-B14F-4D97-AF65-F5344CB8AC3E}">
+        <p14:creationId xmlns:p14="http://schemas.microsoft.com/office/powerpoint/2010/main" val="1523483753"/>
+      </p:ext>
+    </p:extLst>
+  </p:cSld>
+  <p:clrMapOvr>
+    <a:masterClrMapping/>
+  </p:clrMapOvr>
+  <p:timing>
+    <p:tnLst>
+      <p:par>
+        <p:cTn id="1" dur="indefinite" restart="never" nodeType="tmRoot"/>
+      </p:par>
+    </p:tnLst>
+  </p:timing>
+</p:sld>
+</file>
+
+<file path=ppt/slides/slide8.xml><?xml version="1.0" encoding="utf-8"?>
+<p:sld xmlns:a="http://schemas.openxmlformats.org/drawingml/2006/main" xmlns:r="http://schemas.openxmlformats.org/officeDocument/2006/relationships" xmlns:p="http://schemas.openxmlformats.org/presentationml/2006/main">
+  <p:cSld>
+    <p:spTree>
+      <p:nvGrpSpPr>
+        <p:cNvPr id="1" name=""/>
+        <p:cNvGrpSpPr/>
+        <p:nvPr/>
+      </p:nvGrpSpPr>
+      <p:grpSpPr>
+        <a:xfrm>
+          <a:off x="0" y="0"/>
+          <a:ext cx="0" cy="0"/>
+          <a:chOff x="0" y="0"/>
+          <a:chExt cx="0" cy="0"/>
+        </a:xfrm>
+      </p:grpSpPr>
+      <p:sp>
+        <p:nvSpPr>
+          <p:cNvPr id="2" name="Título 1"/>
+          <p:cNvSpPr>
+            <a:spLocks noGrp="1"/>
+          </p:cNvSpPr>
+          <p:nvPr>
+            <p:ph type="title"/>
+          </p:nvPr>
+        </p:nvSpPr>
+        <p:spPr/>
+        <p:txBody>
+          <a:bodyPr>
+            <a:normAutofit fontScale="90000"/>
+          </a:bodyPr>
+          <a:lstStyle/>
+          <a:p>
+            <a:r>
+              <a:rPr lang="pt-BR" dirty="0"/>
+              <a:t>LEAD TIME ESTRATIFICADOS POR ÁREA</a:t>
+            </a:r>
+            <a:endParaRPr lang="en-US" dirty="0"/>
+          </a:p>
+        </p:txBody>
+      </p:sp>
+      <p:graphicFrame>
+        <p:nvGraphicFramePr>
+          <p:cNvPr id="5" name="Espaço Reservado para Conteúdo 4"/>
+          <p:cNvGraphicFramePr>
+            <a:graphicFrameLocks noGrp="1"/>
+          </p:cNvGraphicFramePr>
+          <p:nvPr>
+            <p:ph idx="1"/>
+            <p:extLst>
+              <p:ext uri="{D42A27DB-BD31-4B8C-83A1-F6EECF244321}">
+                <p14:modId xmlns:p14="http://schemas.microsoft.com/office/powerpoint/2010/main" val="2789345899"/>
+              </p:ext>
+            </p:extLst>
+          </p:nvPr>
+        </p:nvGraphicFramePr>
+        <p:xfrm>
+          <a:off x="251520" y="1988840"/>
+          <a:ext cx="1219200" cy="2266950"/>
+        </p:xfrm>
+        <a:graphic>
+          <a:graphicData uri="http://schemas.openxmlformats.org/drawingml/2006/table">
+            <a:tbl>
+              <a:tblPr/>
+              <a:tblGrid>
+                <a:gridCol w="609600"/>
+                <a:gridCol w="609600"/>
+              </a:tblGrid>
+              <a:tr h="133350">
+                <a:tc gridSpan="2">
+                  <a:txBody>
+                    <a:bodyPr/>
+                    <a:lstStyle/>
+                    <a:p>
+                      <a:pPr algn="l" fontAlgn="b"/>
+                      <a:r>
+                        <a:rPr lang="en-US" sz="800" b="1" i="0" u="none" strike="noStrike" dirty="0">
+                          <a:solidFill>
+                            <a:srgbClr val="000000"/>
+                          </a:solidFill>
+                          <a:effectLst/>
+                          <a:latin typeface="Verdana"/>
+                        </a:rPr>
+                        <a:t>DADOS AGRUPADOS:</a:t>
+                      </a:r>
+                    </a:p>
+                  </a:txBody>
+                  <a:tcPr marL="9525" marR="9525" marT="9525" marB="0" anchor="b">
+                    <a:lnL>
+                      <a:noFill/>
+                    </a:lnL>
+                    <a:lnR>
+                      <a:noFill/>
+                    </a:lnR>
+                    <a:lnT>
+                      <a:noFill/>
+                    </a:lnT>
+                    <a:lnB>
+                      <a:noFill/>
+                    </a:lnB>
+                  </a:tcPr>
+                </a:tc>
+                <a:tc hMerge="1">
+                  <a:txBody>
+                    <a:bodyPr/>
+                    <a:lstStyle/>
+                    <a:p>
+                      <a:endParaRPr lang="en-US"/>
+                    </a:p>
+                  </a:txBody>
+                  <a:tcPr/>
+                </a:tc>
+              </a:tr>
+              <a:tr h="133350">
+                <a:tc>
+                  <a:txBody>
+                    <a:bodyPr/>
+                    <a:lstStyle/>
+                    <a:p>
+                      <a:pPr algn="l" fontAlgn="b"/>
+                      <a:endParaRPr lang="en-US" sz="800" b="0" i="0" u="none" strike="noStrike">
+                        <a:solidFill>
+                          <a:srgbClr val="000000"/>
+                        </a:solidFill>
+                        <a:effectLst/>
+                        <a:latin typeface="Verdana"/>
+                      </a:endParaRPr>
+                    </a:p>
+                  </a:txBody>
+                  <a:tcPr marL="9525" marR="9525" marT="9525" marB="0" anchor="b">
+                    <a:lnL>
+                      <a:noFill/>
+                    </a:lnL>
+                    <a:lnR>
+                      <a:noFill/>
+                    </a:lnR>
+                    <a:lnT>
+                      <a:noFill/>
+                    </a:lnT>
+                    <a:lnB>
+                      <a:noFill/>
+                    </a:lnB>
+                  </a:tcPr>
+                </a:tc>
+                <a:tc>
+                  <a:txBody>
+                    <a:bodyPr/>
+                    <a:lstStyle/>
+                    <a:p>
+                      <a:pPr algn="l" fontAlgn="b"/>
+                      <a:endParaRPr lang="en-US" sz="800" b="0" i="0" u="none" strike="noStrike">
+                        <a:solidFill>
+                          <a:srgbClr val="000000"/>
+                        </a:solidFill>
+                        <a:effectLst/>
+                        <a:latin typeface="Verdana"/>
+                      </a:endParaRPr>
+                    </a:p>
+                  </a:txBody>
+                  <a:tcPr marL="9525" marR="9525" marT="9525" marB="0" anchor="b">
+                    <a:lnL>
+                      <a:noFill/>
+                    </a:lnL>
+                    <a:lnR>
+                      <a:noFill/>
+                    </a:lnR>
+                    <a:lnT>
+                      <a:noFill/>
+                    </a:lnT>
+                    <a:lnB>
+                      <a:noFill/>
+                    </a:lnB>
+                  </a:tcPr>
+                </a:tc>
+              </a:tr>
+              <a:tr h="133350">
+                <a:tc>
+                  <a:txBody>
+                    <a:bodyPr/>
+                    <a:lstStyle/>
+                    <a:p>
+                      <a:pPr algn="l" fontAlgn="b"/>
+                      <a:r>
+                        <a:rPr lang="en-US" sz="800" b="0" i="0" u="none" strike="noStrike">
+                          <a:solidFill>
+                            <a:srgbClr val="000000"/>
+                          </a:solidFill>
+                          <a:effectLst/>
+                          <a:latin typeface="Verdana"/>
+                        </a:rPr>
+                        <a:t>140ZE  </a:t>
+                      </a:r>
+                    </a:p>
+                  </a:txBody>
+                  <a:tcPr marL="9525" marR="9525" marT="9525" marB="0" anchor="b">
+                    <a:lnL>
+                      <a:noFill/>
+                    </a:lnL>
+                    <a:lnR>
+                      <a:noFill/>
+                    </a:lnR>
+                    <a:lnT>
+                      <a:noFill/>
+                    </a:lnT>
+                    <a:lnB>
+                      <a:noFill/>
+                    </a:lnB>
+                  </a:tcPr>
+                </a:tc>
+                <a:tc>
+                  <a:txBody>
+                    <a:bodyPr/>
+                    <a:lstStyle/>
+                    <a:p>
+                      <a:pPr algn="r" fontAlgn="b"/>
+                      <a:r>
+                        <a:rPr lang="en-US" sz="800" b="0" i="0" u="none" strike="noStrike">
+                          <a:solidFill>
+                            <a:srgbClr val="000000"/>
+                          </a:solidFill>
+                          <a:effectLst/>
+                          <a:latin typeface="Verdana"/>
+                        </a:rPr>
+                        <a:t>10</a:t>
+                      </a:r>
+                    </a:p>
+                  </a:txBody>
+                  <a:tcPr marL="9525" marR="9525" marT="9525" marB="0" anchor="b">
+                    <a:lnL>
+                      <a:noFill/>
+                    </a:lnL>
+                    <a:lnR>
+                      <a:noFill/>
+                    </a:lnR>
+                    <a:lnT>
+                      <a:noFill/>
+                    </a:lnT>
+                    <a:lnB>
+                      <a:noFill/>
+                    </a:lnB>
+                    <a:solidFill>
+                      <a:srgbClr val="FBD2D5"/>
+                    </a:solidFill>
+                  </a:tcPr>
+                </a:tc>
+              </a:tr>
+              <a:tr h="133350">
+                <a:tc>
+                  <a:txBody>
+                    <a:bodyPr/>
+                    <a:lstStyle/>
+                    <a:p>
+                      <a:pPr algn="l" fontAlgn="b"/>
+                      <a:r>
+                        <a:rPr lang="en-US" sz="800" b="0" i="0" u="none" strike="noStrike">
+                          <a:solidFill>
+                            <a:srgbClr val="000000"/>
+                          </a:solidFill>
+                          <a:effectLst/>
+                          <a:latin typeface="Verdana"/>
+                        </a:rPr>
+                        <a:t>ASSISEG  </a:t>
+                      </a:r>
+                    </a:p>
+                  </a:txBody>
+                  <a:tcPr marL="9525" marR="9525" marT="9525" marB="0" anchor="b">
+                    <a:lnL>
+                      <a:noFill/>
+                    </a:lnL>
+                    <a:lnR>
+                      <a:noFill/>
+                    </a:lnR>
+                    <a:lnT>
+                      <a:noFill/>
+                    </a:lnT>
+                    <a:lnB>
+                      <a:noFill/>
+                    </a:lnB>
+                  </a:tcPr>
+                </a:tc>
+                <a:tc>
+                  <a:txBody>
+                    <a:bodyPr/>
+                    <a:lstStyle/>
+                    <a:p>
+                      <a:pPr algn="r" fontAlgn="b"/>
+                      <a:r>
+                        <a:rPr lang="en-US" sz="800" b="0" i="0" u="none" strike="noStrike">
+                          <a:solidFill>
+                            <a:srgbClr val="000000"/>
+                          </a:solidFill>
+                          <a:effectLst/>
+                          <a:latin typeface="Verdana"/>
+                        </a:rPr>
+                        <a:t>1</a:t>
+                      </a:r>
+                    </a:p>
+                  </a:txBody>
+                  <a:tcPr marL="9525" marR="9525" marT="9525" marB="0" anchor="b">
+                    <a:lnL>
+                      <a:noFill/>
+                    </a:lnL>
+                    <a:lnR>
+                      <a:noFill/>
+                    </a:lnR>
+                    <a:lnT>
+                      <a:noFill/>
+                    </a:lnT>
+                    <a:lnB>
+                      <a:noFill/>
+                    </a:lnB>
+                    <a:solidFill>
+                      <a:srgbClr val="FCFCFF"/>
+                    </a:solidFill>
+                  </a:tcPr>
+                </a:tc>
+              </a:tr>
+              <a:tr h="133350">
+                <a:tc>
+                  <a:txBody>
+                    <a:bodyPr/>
+                    <a:lstStyle/>
+                    <a:p>
+                      <a:pPr algn="l" fontAlgn="b"/>
+                      <a:r>
+                        <a:rPr lang="en-US" sz="800" b="0" i="0" u="none" strike="noStrike">
+                          <a:solidFill>
+                            <a:srgbClr val="000000"/>
+                          </a:solidFill>
+                          <a:effectLst/>
+                          <a:latin typeface="Verdana"/>
+                        </a:rPr>
+                        <a:t>CAA  </a:t>
+                      </a:r>
+                    </a:p>
+                  </a:txBody>
+                  <a:tcPr marL="9525" marR="9525" marT="9525" marB="0" anchor="b">
+                    <a:lnL>
+                      <a:noFill/>
+                    </a:lnL>
+                    <a:lnR>
+                      <a:noFill/>
+                    </a:lnR>
+                    <a:lnT>
+                      <a:noFill/>
+                    </a:lnT>
+                    <a:lnB>
+                      <a:noFill/>
+                    </a:lnB>
+                  </a:tcPr>
+                </a:tc>
+                <a:tc>
+                  <a:txBody>
+                    <a:bodyPr/>
+                    <a:lstStyle/>
+                    <a:p>
+                      <a:pPr algn="r" fontAlgn="b"/>
+                      <a:r>
+                        <a:rPr lang="en-US" sz="800" b="0" i="0" u="none" strike="noStrike">
+                          <a:solidFill>
+                            <a:srgbClr val="000000"/>
+                          </a:solidFill>
+                          <a:effectLst/>
+                          <a:latin typeface="Verdana"/>
+                        </a:rPr>
+                        <a:t>5</a:t>
+                      </a:r>
+                    </a:p>
+                  </a:txBody>
+                  <a:tcPr marL="9525" marR="9525" marT="9525" marB="0" anchor="b">
+                    <a:lnL>
+                      <a:noFill/>
+                    </a:lnL>
+                    <a:lnR>
+                      <a:noFill/>
+                    </a:lnR>
+                    <a:lnT>
+                      <a:noFill/>
+                    </a:lnT>
+                    <a:lnB>
+                      <a:noFill/>
+                    </a:lnB>
+                    <a:solidFill>
+                      <a:srgbClr val="FCEAEC"/>
+                    </a:solidFill>
+                  </a:tcPr>
+                </a:tc>
+              </a:tr>
+              <a:tr h="133350">
+                <a:tc>
+                  <a:txBody>
+                    <a:bodyPr/>
+                    <a:lstStyle/>
+                    <a:p>
+                      <a:pPr algn="l" fontAlgn="b"/>
+                      <a:r>
+                        <a:rPr lang="en-US" sz="800" b="0" i="0" u="none" strike="noStrike">
+                          <a:solidFill>
+                            <a:srgbClr val="000000"/>
+                          </a:solidFill>
+                          <a:effectLst/>
+                          <a:latin typeface="Verdana"/>
+                        </a:rPr>
+                        <a:t>SECADM  </a:t>
+                      </a:r>
+                    </a:p>
+                  </a:txBody>
+                  <a:tcPr marL="9525" marR="9525" marT="9525" marB="0" anchor="b">
+                    <a:lnL>
+                      <a:noFill/>
+                    </a:lnL>
+                    <a:lnR>
+                      <a:noFill/>
+                    </a:lnR>
+                    <a:lnT>
+                      <a:noFill/>
+                    </a:lnT>
+                    <a:lnB>
+                      <a:noFill/>
+                    </a:lnB>
+                  </a:tcPr>
+                </a:tc>
+                <a:tc>
+                  <a:txBody>
+                    <a:bodyPr/>
+                    <a:lstStyle/>
+                    <a:p>
+                      <a:pPr algn="r" fontAlgn="b"/>
+                      <a:r>
+                        <a:rPr lang="en-US" sz="800" b="0" i="0" u="none" strike="noStrike">
+                          <a:solidFill>
+                            <a:srgbClr val="000000"/>
+                          </a:solidFill>
+                          <a:effectLst/>
+                          <a:latin typeface="Verdana"/>
+                        </a:rPr>
+                        <a:t>2</a:t>
+                      </a:r>
+                    </a:p>
+                  </a:txBody>
+                  <a:tcPr marL="9525" marR="9525" marT="9525" marB="0" anchor="b">
+                    <a:lnL>
+                      <a:noFill/>
+                    </a:lnL>
+                    <a:lnR>
+                      <a:noFill/>
+                    </a:lnR>
+                    <a:lnT>
+                      <a:noFill/>
+                    </a:lnT>
+                    <a:lnB>
+                      <a:noFill/>
+                    </a:lnB>
+                    <a:solidFill>
+                      <a:srgbClr val="FCF8FB"/>
+                    </a:solidFill>
+                  </a:tcPr>
+                </a:tc>
+              </a:tr>
+              <a:tr h="133350">
+                <a:tc>
+                  <a:txBody>
+                    <a:bodyPr/>
+                    <a:lstStyle/>
+                    <a:p>
+                      <a:pPr algn="l" fontAlgn="b"/>
+                      <a:r>
+                        <a:rPr lang="en-US" sz="800" b="0" i="0" u="none" strike="noStrike">
+                          <a:solidFill>
+                            <a:srgbClr val="000000"/>
+                          </a:solidFill>
+                          <a:effectLst/>
+                          <a:latin typeface="Verdana"/>
+                        </a:rPr>
+                        <a:t>SPO  </a:t>
+                      </a:r>
+                    </a:p>
+                  </a:txBody>
+                  <a:tcPr marL="9525" marR="9525" marT="9525" marB="0" anchor="b">
+                    <a:lnL>
+                      <a:noFill/>
+                    </a:lnL>
+                    <a:lnR>
+                      <a:noFill/>
+                    </a:lnR>
+                    <a:lnT>
+                      <a:noFill/>
+                    </a:lnT>
+                    <a:lnB>
+                      <a:noFill/>
+                    </a:lnB>
+                  </a:tcPr>
+                </a:tc>
+                <a:tc>
+                  <a:txBody>
+                    <a:bodyPr/>
+                    <a:lstStyle/>
+                    <a:p>
+                      <a:pPr algn="r" fontAlgn="b"/>
+                      <a:r>
+                        <a:rPr lang="en-US" sz="800" b="0" i="0" u="none" strike="noStrike">
+                          <a:solidFill>
+                            <a:srgbClr val="000000"/>
+                          </a:solidFill>
+                          <a:effectLst/>
+                          <a:latin typeface="Verdana"/>
+                        </a:rPr>
+                        <a:t>2</a:t>
+                      </a:r>
+                    </a:p>
+                  </a:txBody>
+                  <a:tcPr marL="9525" marR="9525" marT="9525" marB="0" anchor="b">
+                    <a:lnL>
+                      <a:noFill/>
+                    </a:lnL>
+                    <a:lnR>
+                      <a:noFill/>
+                    </a:lnR>
+                    <a:lnT>
+                      <a:noFill/>
+                    </a:lnT>
+                    <a:lnB>
+                      <a:noFill/>
+                    </a:lnB>
+                    <a:solidFill>
+                      <a:srgbClr val="FCF8FB"/>
+                    </a:solidFill>
+                  </a:tcPr>
+                </a:tc>
+              </a:tr>
+              <a:tr h="133350">
+                <a:tc>
+                  <a:txBody>
+                    <a:bodyPr/>
+                    <a:lstStyle/>
+                    <a:p>
+                      <a:pPr algn="l" fontAlgn="b"/>
+                      <a:r>
+                        <a:rPr lang="en-US" sz="800" b="0" i="0" u="none" strike="noStrike">
+                          <a:solidFill>
+                            <a:srgbClr val="000000"/>
+                          </a:solidFill>
+                          <a:effectLst/>
+                          <a:latin typeface="Verdana"/>
+                        </a:rPr>
+                        <a:t>CO  </a:t>
+                      </a:r>
+                    </a:p>
+                  </a:txBody>
+                  <a:tcPr marL="9525" marR="9525" marT="9525" marB="0" anchor="b">
+                    <a:lnL>
+                      <a:noFill/>
+                    </a:lnL>
+                    <a:lnR>
+                      <a:noFill/>
+                    </a:lnR>
+                    <a:lnT>
+                      <a:noFill/>
+                    </a:lnT>
+                    <a:lnB>
+                      <a:noFill/>
+                    </a:lnB>
+                  </a:tcPr>
+                </a:tc>
+                <a:tc>
+                  <a:txBody>
+                    <a:bodyPr/>
+                    <a:lstStyle/>
+                    <a:p>
+                      <a:pPr algn="r" fontAlgn="b"/>
+                      <a:r>
+                        <a:rPr lang="en-US" sz="800" b="0" i="0" u="none" strike="noStrike">
+                          <a:solidFill>
+                            <a:srgbClr val="000000"/>
+                          </a:solidFill>
+                          <a:effectLst/>
+                          <a:latin typeface="Verdana"/>
+                        </a:rPr>
+                        <a:t>2</a:t>
+                      </a:r>
+                    </a:p>
+                  </a:txBody>
+                  <a:tcPr marL="9525" marR="9525" marT="9525" marB="0" anchor="b">
+                    <a:lnL>
+                      <a:noFill/>
+                    </a:lnL>
+                    <a:lnR>
+                      <a:noFill/>
+                    </a:lnR>
+                    <a:lnT>
+                      <a:noFill/>
+                    </a:lnT>
+                    <a:lnB>
+                      <a:noFill/>
+                    </a:lnB>
+                    <a:solidFill>
+                      <a:srgbClr val="FCF8FB"/>
+                    </a:solidFill>
+                  </a:tcPr>
+                </a:tc>
+              </a:tr>
+              <a:tr h="133350">
+                <a:tc>
+                  <a:txBody>
+                    <a:bodyPr/>
+                    <a:lstStyle/>
+                    <a:p>
+                      <a:pPr algn="l" fontAlgn="b"/>
+                      <a:r>
+                        <a:rPr lang="en-US" sz="800" b="0" i="0" u="none" strike="noStrike">
+                          <a:solidFill>
+                            <a:srgbClr val="000000"/>
+                          </a:solidFill>
+                          <a:effectLst/>
+                          <a:latin typeface="Verdana"/>
+                        </a:rPr>
+                        <a:t>SECOFC  </a:t>
+                      </a:r>
+                    </a:p>
+                  </a:txBody>
+                  <a:tcPr marL="9525" marR="9525" marT="9525" marB="0" anchor="b">
+                    <a:lnL>
+                      <a:noFill/>
+                    </a:lnL>
+                    <a:lnR>
+                      <a:noFill/>
+                    </a:lnR>
+                    <a:lnT>
+                      <a:noFill/>
+                    </a:lnT>
+                    <a:lnB>
+                      <a:noFill/>
+                    </a:lnB>
+                  </a:tcPr>
+                </a:tc>
+                <a:tc>
+                  <a:txBody>
+                    <a:bodyPr/>
+                    <a:lstStyle/>
+                    <a:p>
+                      <a:pPr algn="r" fontAlgn="b"/>
+                      <a:r>
+                        <a:rPr lang="en-US" sz="800" b="0" i="0" u="none" strike="noStrike">
+                          <a:solidFill>
+                            <a:srgbClr val="000000"/>
+                          </a:solidFill>
+                          <a:effectLst/>
+                          <a:latin typeface="Verdana"/>
+                        </a:rPr>
+                        <a:t>2</a:t>
+                      </a:r>
+                    </a:p>
+                  </a:txBody>
+                  <a:tcPr marL="9525" marR="9525" marT="9525" marB="0" anchor="b">
+                    <a:lnL>
+                      <a:noFill/>
+                    </a:lnL>
+                    <a:lnR>
+                      <a:noFill/>
+                    </a:lnR>
+                    <a:lnT>
+                      <a:noFill/>
+                    </a:lnT>
+                    <a:lnB>
+                      <a:noFill/>
+                    </a:lnB>
+                    <a:solidFill>
+                      <a:srgbClr val="FCF8FB"/>
+                    </a:solidFill>
+                  </a:tcPr>
+                </a:tc>
+              </a:tr>
+              <a:tr h="133350">
+                <a:tc>
+                  <a:txBody>
+                    <a:bodyPr/>
+                    <a:lstStyle/>
+                    <a:p>
+                      <a:pPr algn="l" fontAlgn="b"/>
+                      <a:r>
+                        <a:rPr lang="en-US" sz="800" b="0" i="0" u="none" strike="noStrike">
+                          <a:solidFill>
+                            <a:srgbClr val="000000"/>
+                          </a:solidFill>
+                          <a:effectLst/>
+                          <a:latin typeface="Verdana"/>
+                        </a:rPr>
+                        <a:t>CLC  </a:t>
+                      </a:r>
+                    </a:p>
+                  </a:txBody>
+                  <a:tcPr marL="9525" marR="9525" marT="9525" marB="0" anchor="b">
+                    <a:lnL>
+                      <a:noFill/>
+                    </a:lnL>
+                    <a:lnR>
+                      <a:noFill/>
+                    </a:lnR>
+                    <a:lnT>
+                      <a:noFill/>
+                    </a:lnT>
+                    <a:lnB>
+                      <a:noFill/>
+                    </a:lnB>
+                  </a:tcPr>
+                </a:tc>
+                <a:tc>
+                  <a:txBody>
+                    <a:bodyPr/>
+                    <a:lstStyle/>
+                    <a:p>
+                      <a:pPr algn="r" fontAlgn="b"/>
+                      <a:r>
+                        <a:rPr lang="en-US" sz="800" b="0" i="0" u="none" strike="noStrike">
+                          <a:solidFill>
+                            <a:srgbClr val="000000"/>
+                          </a:solidFill>
+                          <a:effectLst/>
+                          <a:latin typeface="Verdana"/>
+                        </a:rPr>
+                        <a:t>6</a:t>
+                      </a:r>
+                    </a:p>
+                  </a:txBody>
+                  <a:tcPr marL="9525" marR="9525" marT="9525" marB="0" anchor="b">
+                    <a:lnL>
+                      <a:noFill/>
+                    </a:lnL>
+                    <a:lnR>
+                      <a:noFill/>
+                    </a:lnR>
+                    <a:lnT>
+                      <a:noFill/>
+                    </a:lnT>
+                    <a:lnB>
+                      <a:noFill/>
+                    </a:lnB>
+                    <a:solidFill>
+                      <a:srgbClr val="FCE5E8"/>
+                    </a:solidFill>
+                  </a:tcPr>
+                </a:tc>
+              </a:tr>
+              <a:tr h="133350">
+                <a:tc>
+                  <a:txBody>
+                    <a:bodyPr/>
+                    <a:lstStyle/>
+                    <a:p>
+                      <a:pPr algn="l" fontAlgn="b"/>
+                      <a:r>
+                        <a:rPr lang="en-US" sz="800" b="0" i="0" u="none" strike="noStrike">
+                          <a:solidFill>
+                            <a:srgbClr val="000000"/>
+                          </a:solidFill>
+                          <a:effectLst/>
+                          <a:latin typeface="Verdana"/>
+                        </a:rPr>
+                        <a:t>SC  </a:t>
+                      </a:r>
+                    </a:p>
+                  </a:txBody>
+                  <a:tcPr marL="9525" marR="9525" marT="9525" marB="0" anchor="b">
+                    <a:lnL>
+                      <a:noFill/>
+                    </a:lnL>
+                    <a:lnR>
+                      <a:noFill/>
+                    </a:lnR>
+                    <a:lnT>
+                      <a:noFill/>
+                    </a:lnT>
+                    <a:lnB>
+                      <a:noFill/>
+                    </a:lnB>
+                  </a:tcPr>
+                </a:tc>
+                <a:tc>
+                  <a:txBody>
+                    <a:bodyPr/>
+                    <a:lstStyle/>
+                    <a:p>
+                      <a:pPr algn="r" fontAlgn="b"/>
+                      <a:r>
+                        <a:rPr lang="en-US" sz="800" b="0" i="0" u="none" strike="noStrike">
+                          <a:solidFill>
+                            <a:srgbClr val="000000"/>
+                          </a:solidFill>
+                          <a:effectLst/>
+                          <a:latin typeface="Verdana"/>
+                        </a:rPr>
+                        <a:t>12</a:t>
+                      </a:r>
+                    </a:p>
+                  </a:txBody>
+                  <a:tcPr marL="9525" marR="9525" marT="9525" marB="0" anchor="b">
+                    <a:lnL>
+                      <a:noFill/>
+                    </a:lnL>
+                    <a:lnR>
+                      <a:noFill/>
+                    </a:lnR>
+                    <a:lnT>
+                      <a:noFill/>
+                    </a:lnT>
+                    <a:lnB>
+                      <a:noFill/>
+                    </a:lnB>
+                    <a:solidFill>
+                      <a:srgbClr val="FBC8CB"/>
+                    </a:solidFill>
+                  </a:tcPr>
+                </a:tc>
+              </a:tr>
+              <a:tr h="133350">
+                <a:tc>
+                  <a:txBody>
+                    <a:bodyPr/>
+                    <a:lstStyle/>
+                    <a:p>
+                      <a:pPr algn="l" fontAlgn="b"/>
+                      <a:r>
+                        <a:rPr lang="en-US" sz="800" b="0" i="0" u="none" strike="noStrike">
+                          <a:solidFill>
+                            <a:srgbClr val="000000"/>
+                          </a:solidFill>
+                          <a:effectLst/>
+                          <a:latin typeface="Verdana"/>
+                        </a:rPr>
+                        <a:t>SCON  </a:t>
+                      </a:r>
+                    </a:p>
+                  </a:txBody>
+                  <a:tcPr marL="9525" marR="9525" marT="9525" marB="0" anchor="b">
+                    <a:lnL>
+                      <a:noFill/>
+                    </a:lnL>
+                    <a:lnR>
+                      <a:noFill/>
+                    </a:lnR>
+                    <a:lnT>
+                      <a:noFill/>
+                    </a:lnT>
+                    <a:lnB>
+                      <a:noFill/>
+                    </a:lnB>
+                  </a:tcPr>
+                </a:tc>
+                <a:tc>
+                  <a:txBody>
+                    <a:bodyPr/>
+                    <a:lstStyle/>
+                    <a:p>
+                      <a:pPr algn="r" fontAlgn="b"/>
+                      <a:r>
+                        <a:rPr lang="en-US" sz="800" b="0" i="0" u="none" strike="noStrike">
+                          <a:solidFill>
+                            <a:srgbClr val="000000"/>
+                          </a:solidFill>
+                          <a:effectLst/>
+                          <a:latin typeface="Verdana"/>
+                        </a:rPr>
+                        <a:t>32</a:t>
+                      </a:r>
+                    </a:p>
+                  </a:txBody>
+                  <a:tcPr marL="9525" marR="9525" marT="9525" marB="0" anchor="b">
+                    <a:lnL>
+                      <a:noFill/>
+                    </a:lnL>
+                    <a:lnR>
+                      <a:noFill/>
+                    </a:lnR>
+                    <a:lnT>
+                      <a:noFill/>
+                    </a:lnT>
+                    <a:lnB>
+                      <a:noFill/>
+                    </a:lnB>
+                    <a:solidFill>
+                      <a:srgbClr val="F8696B"/>
+                    </a:solidFill>
+                  </a:tcPr>
+                </a:tc>
+              </a:tr>
+              <a:tr h="133350">
+                <a:tc>
+                  <a:txBody>
+                    <a:bodyPr/>
+                    <a:lstStyle/>
+                    <a:p>
+                      <a:pPr algn="l" fontAlgn="b"/>
+                      <a:r>
+                        <a:rPr lang="en-US" sz="800" b="0" i="0" u="none" strike="noStrike">
+                          <a:solidFill>
+                            <a:srgbClr val="000000"/>
+                          </a:solidFill>
+                          <a:effectLst/>
+                          <a:latin typeface="Verdana"/>
+                        </a:rPr>
+                        <a:t>ASSDG  </a:t>
+                      </a:r>
+                    </a:p>
+                  </a:txBody>
+                  <a:tcPr marL="9525" marR="9525" marT="9525" marB="0" anchor="b">
+                    <a:lnL>
+                      <a:noFill/>
+                    </a:lnL>
+                    <a:lnR>
+                      <a:noFill/>
+                    </a:lnR>
+                    <a:lnT>
+                      <a:noFill/>
+                    </a:lnT>
+                    <a:lnB>
+                      <a:noFill/>
+                    </a:lnB>
+                  </a:tcPr>
+                </a:tc>
+                <a:tc>
+                  <a:txBody>
+                    <a:bodyPr/>
+                    <a:lstStyle/>
+                    <a:p>
+                      <a:pPr algn="r" fontAlgn="b"/>
+                      <a:r>
+                        <a:rPr lang="en-US" sz="800" b="0" i="0" u="none" strike="noStrike">
+                          <a:solidFill>
+                            <a:srgbClr val="000000"/>
+                          </a:solidFill>
+                          <a:effectLst/>
+                          <a:latin typeface="Verdana"/>
+                        </a:rPr>
+                        <a:t>6</a:t>
+                      </a:r>
+                    </a:p>
+                  </a:txBody>
+                  <a:tcPr marL="9525" marR="9525" marT="9525" marB="0" anchor="b">
+                    <a:lnL>
+                      <a:noFill/>
+                    </a:lnL>
+                    <a:lnR>
+                      <a:noFill/>
+                    </a:lnR>
+                    <a:lnT>
+                      <a:noFill/>
+                    </a:lnT>
+                    <a:lnB>
+                      <a:noFill/>
+                    </a:lnB>
+                    <a:solidFill>
+                      <a:srgbClr val="FCE5E8"/>
+                    </a:solidFill>
+                  </a:tcPr>
+                </a:tc>
+              </a:tr>
+              <a:tr h="133350">
+                <a:tc>
+                  <a:txBody>
+                    <a:bodyPr/>
+                    <a:lstStyle/>
+                    <a:p>
+                      <a:pPr algn="l" fontAlgn="b"/>
+                      <a:r>
+                        <a:rPr lang="en-US" sz="800" b="0" i="0" u="none" strike="noStrike">
+                          <a:solidFill>
+                            <a:srgbClr val="000000"/>
+                          </a:solidFill>
+                          <a:effectLst/>
+                          <a:latin typeface="Verdana"/>
+                        </a:rPr>
+                        <a:t>CLC  </a:t>
+                      </a:r>
+                    </a:p>
+                  </a:txBody>
+                  <a:tcPr marL="9525" marR="9525" marT="9525" marB="0" anchor="b">
+                    <a:lnL>
+                      <a:noFill/>
+                    </a:lnL>
+                    <a:lnR>
+                      <a:noFill/>
+                    </a:lnR>
+                    <a:lnT>
+                      <a:noFill/>
+                    </a:lnT>
+                    <a:lnB>
+                      <a:noFill/>
+                    </a:lnB>
+                  </a:tcPr>
+                </a:tc>
+                <a:tc>
+                  <a:txBody>
+                    <a:bodyPr/>
+                    <a:lstStyle/>
+                    <a:p>
+                      <a:pPr algn="r" fontAlgn="b"/>
+                      <a:r>
+                        <a:rPr lang="en-US" sz="800" b="0" i="0" u="none" strike="noStrike">
+                          <a:solidFill>
+                            <a:srgbClr val="000000"/>
+                          </a:solidFill>
+                          <a:effectLst/>
+                          <a:latin typeface="Verdana"/>
+                        </a:rPr>
+                        <a:t>8</a:t>
+                      </a:r>
+                    </a:p>
+                  </a:txBody>
+                  <a:tcPr marL="9525" marR="9525" marT="9525" marB="0" anchor="b">
+                    <a:lnL>
+                      <a:noFill/>
+                    </a:lnL>
+                    <a:lnR>
+                      <a:noFill/>
+                    </a:lnR>
+                    <a:lnT>
+                      <a:noFill/>
+                    </a:lnT>
+                    <a:lnB>
+                      <a:noFill/>
+                    </a:lnB>
+                    <a:solidFill>
+                      <a:srgbClr val="FCDBDE"/>
+                    </a:solidFill>
+                  </a:tcPr>
+                </a:tc>
+              </a:tr>
+              <a:tr h="133350">
+                <a:tc>
+                  <a:txBody>
+                    <a:bodyPr/>
+                    <a:lstStyle/>
+                    <a:p>
+                      <a:pPr algn="l" fontAlgn="b"/>
+                      <a:r>
+                        <a:rPr lang="en-US" sz="800" b="0" i="0" u="none" strike="noStrike">
+                          <a:solidFill>
+                            <a:srgbClr val="000000"/>
+                          </a:solidFill>
+                          <a:effectLst/>
+                          <a:latin typeface="Verdana"/>
+                        </a:rPr>
+                        <a:t>DG  </a:t>
+                      </a:r>
+                    </a:p>
+                  </a:txBody>
+                  <a:tcPr marL="9525" marR="9525" marT="9525" marB="0" anchor="b">
+                    <a:lnL>
+                      <a:noFill/>
+                    </a:lnL>
+                    <a:lnR>
+                      <a:noFill/>
+                    </a:lnR>
+                    <a:lnT>
+                      <a:noFill/>
+                    </a:lnT>
+                    <a:lnB>
+                      <a:noFill/>
+                    </a:lnB>
+                  </a:tcPr>
+                </a:tc>
+                <a:tc>
+                  <a:txBody>
+                    <a:bodyPr/>
+                    <a:lstStyle/>
+                    <a:p>
+                      <a:pPr algn="r" fontAlgn="b"/>
+                      <a:r>
+                        <a:rPr lang="en-US" sz="800" b="0" i="0" u="none" strike="noStrike">
+                          <a:solidFill>
+                            <a:srgbClr val="000000"/>
+                          </a:solidFill>
+                          <a:effectLst/>
+                          <a:latin typeface="Verdana"/>
+                        </a:rPr>
+                        <a:t>2</a:t>
+                      </a:r>
+                    </a:p>
+                  </a:txBody>
+                  <a:tcPr marL="9525" marR="9525" marT="9525" marB="0" anchor="b">
+                    <a:lnL>
+                      <a:noFill/>
+                    </a:lnL>
+                    <a:lnR>
+                      <a:noFill/>
+                    </a:lnR>
+                    <a:lnT>
+                      <a:noFill/>
+                    </a:lnT>
+                    <a:lnB>
+                      <a:noFill/>
+                    </a:lnB>
+                    <a:solidFill>
+                      <a:srgbClr val="FCF8FB"/>
+                    </a:solidFill>
+                  </a:tcPr>
+                </a:tc>
+              </a:tr>
+              <a:tr h="133350">
+                <a:tc>
+                  <a:txBody>
+                    <a:bodyPr/>
+                    <a:lstStyle/>
+                    <a:p>
+                      <a:pPr algn="l" fontAlgn="b"/>
+                      <a:r>
+                        <a:rPr lang="en-US" sz="800" b="0" i="0" u="none" strike="noStrike">
+                          <a:solidFill>
+                            <a:srgbClr val="000000"/>
+                          </a:solidFill>
+                          <a:effectLst/>
+                          <a:latin typeface="Verdana"/>
+                        </a:rPr>
+                        <a:t>ACO  </a:t>
+                      </a:r>
+                    </a:p>
+                  </a:txBody>
+                  <a:tcPr marL="9525" marR="9525" marT="9525" marB="0" anchor="b">
+                    <a:lnL>
+                      <a:noFill/>
+                    </a:lnL>
+                    <a:lnR>
+                      <a:noFill/>
+                    </a:lnR>
+                    <a:lnT>
+                      <a:noFill/>
+                    </a:lnT>
+                    <a:lnB>
+                      <a:noFill/>
+                    </a:lnB>
+                  </a:tcPr>
+                </a:tc>
+                <a:tc>
+                  <a:txBody>
+                    <a:bodyPr/>
+                    <a:lstStyle/>
+                    <a:p>
+                      <a:pPr algn="r" fontAlgn="b"/>
+                      <a:r>
+                        <a:rPr lang="en-US" sz="800" b="0" i="0" u="none" strike="noStrike">
+                          <a:solidFill>
+                            <a:srgbClr val="000000"/>
+                          </a:solidFill>
+                          <a:effectLst/>
+                          <a:latin typeface="Verdana"/>
+                        </a:rPr>
+                        <a:t>1</a:t>
+                      </a:r>
+                    </a:p>
+                  </a:txBody>
+                  <a:tcPr marL="9525" marR="9525" marT="9525" marB="0" anchor="b">
+                    <a:lnL>
+                      <a:noFill/>
+                    </a:lnL>
+                    <a:lnR>
+                      <a:noFill/>
+                    </a:lnR>
+                    <a:lnT>
+                      <a:noFill/>
+                    </a:lnT>
+                    <a:lnB>
+                      <a:noFill/>
+                    </a:lnB>
+                    <a:solidFill>
+                      <a:srgbClr val="FCFCFF"/>
+                    </a:solidFill>
+                  </a:tcPr>
+                </a:tc>
+              </a:tr>
+              <a:tr h="133350">
+                <a:tc>
+                  <a:txBody>
+                    <a:bodyPr/>
+                    <a:lstStyle/>
+                    <a:p>
+                      <a:pPr algn="l" fontAlgn="b"/>
+                      <a:r>
+                        <a:rPr lang="en-US" sz="800" b="0" i="0" u="none" strike="noStrike">
+                          <a:solidFill>
+                            <a:srgbClr val="000000"/>
+                          </a:solidFill>
+                          <a:effectLst/>
+                          <a:latin typeface="Verdana"/>
+                        </a:rPr>
+                        <a:t>SAEO  </a:t>
+                      </a:r>
+                    </a:p>
+                  </a:txBody>
+                  <a:tcPr marL="9525" marR="9525" marT="9525" marB="0" anchor="b">
+                    <a:lnL>
+                      <a:noFill/>
+                    </a:lnL>
+                    <a:lnR>
+                      <a:noFill/>
+                    </a:lnR>
+                    <a:lnT>
+                      <a:noFill/>
+                    </a:lnT>
+                    <a:lnB>
+                      <a:noFill/>
+                    </a:lnB>
+                  </a:tcPr>
+                </a:tc>
+                <a:tc>
+                  <a:txBody>
+                    <a:bodyPr/>
+                    <a:lstStyle/>
+                    <a:p>
+                      <a:pPr algn="r" fontAlgn="b"/>
+                      <a:r>
+                        <a:rPr lang="en-US" sz="800" b="0" i="0" u="none" strike="noStrike" dirty="0">
+                          <a:solidFill>
+                            <a:srgbClr val="000000"/>
+                          </a:solidFill>
+                          <a:effectLst/>
+                          <a:latin typeface="Verdana"/>
+                        </a:rPr>
+                        <a:t>2</a:t>
+                      </a:r>
+                    </a:p>
+                  </a:txBody>
+                  <a:tcPr marL="9525" marR="9525" marT="9525" marB="0" anchor="b">
+                    <a:lnL>
+                      <a:noFill/>
+                    </a:lnL>
+                    <a:lnR>
+                      <a:noFill/>
+                    </a:lnR>
+                    <a:lnT>
+                      <a:noFill/>
+                    </a:lnT>
+                    <a:lnB>
+                      <a:noFill/>
+                    </a:lnB>
+                    <a:solidFill>
+                      <a:srgbClr val="FCF8FB"/>
+                    </a:solidFill>
+                  </a:tcPr>
+                </a:tc>
+              </a:tr>
+            </a:tbl>
+          </a:graphicData>
+        </a:graphic>
+      </p:graphicFrame>
+      <p:graphicFrame>
+        <p:nvGraphicFramePr>
+          <p:cNvPr id="6" name="Chart 3"/>
+          <p:cNvGraphicFramePr>
+            <a:graphicFrameLocks/>
+          </p:cNvGraphicFramePr>
+          <p:nvPr>
+            <p:extLst>
+              <p:ext uri="{D42A27DB-BD31-4B8C-83A1-F6EECF244321}">
+                <p14:modId xmlns:p14="http://schemas.microsoft.com/office/powerpoint/2010/main" val="566345054"/>
+              </p:ext>
+            </p:extLst>
+          </p:nvPr>
+        </p:nvGraphicFramePr>
+        <p:xfrm>
+          <a:off x="1763688" y="1484784"/>
+          <a:ext cx="6984206" cy="3919538"/>
+        </p:xfrm>
+        <a:graphic>
+          <a:graphicData uri="http://schemas.openxmlformats.org/drawingml/2006/chart">
+            <c:chart xmlns:c="http://schemas.openxmlformats.org/drawingml/2006/chart" xmlns:r="http://schemas.openxmlformats.org/officeDocument/2006/relationships" r:id="rId2"/>
+          </a:graphicData>
+        </a:graphic>
+      </p:graphicFrame>
+    </p:spTree>
+    <p:extLst>
+      <p:ext uri="{BB962C8B-B14F-4D97-AF65-F5344CB8AC3E}">
+        <p14:creationId xmlns:p14="http://schemas.microsoft.com/office/powerpoint/2010/main" val="3414752968"/>
+      </p:ext>
+    </p:extLst>
+  </p:cSld>
+  <p:clrMapOvr>
+    <a:masterClrMapping/>
+  </p:clrMapOvr>
+  <p:timing>
+    <p:tnLst>
+      <p:par>
+        <p:cTn id="1" dur="indefinite" restart="never" nodeType="tmRoot"/>
+      </p:par>
+    </p:tnLst>
+  </p:timing>
+</p:sld>
+</file>
+
+<file path=ppt/slides/slide9.xml><?xml version="1.0" encoding="utf-8"?>
+<p:sld xmlns:a="http://schemas.openxmlformats.org/drawingml/2006/main" xmlns:r="http://schemas.openxmlformats.org/officeDocument/2006/relationships" xmlns:p="http://schemas.openxmlformats.org/presentationml/2006/main">
+  <p:cSld>
+    <p:spTree>
+      <p:nvGrpSpPr>
+        <p:cNvPr id="1" name=""/>
+        <p:cNvGrpSpPr/>
+        <p:nvPr/>
+      </p:nvGrpSpPr>
+      <p:grpSpPr>
+        <a:xfrm>
+          <a:off x="0" y="0"/>
+          <a:ext cx="0" cy="0"/>
+          <a:chOff x="0" y="0"/>
+          <a:chExt cx="0" cy="0"/>
+        </a:xfrm>
+      </p:grpSpPr>
+      <p:sp>
+        <p:nvSpPr>
+          <p:cNvPr id="2" name="Título 1"/>
+          <p:cNvSpPr>
+            <a:spLocks noGrp="1"/>
+          </p:cNvSpPr>
+          <p:nvPr>
+            <p:ph type="title"/>
+          </p:nvPr>
+        </p:nvSpPr>
+        <p:spPr/>
+        <p:txBody>
+          <a:bodyPr>
+            <a:normAutofit fontScale="90000"/>
+          </a:bodyPr>
+          <a:lstStyle/>
+          <a:p>
+            <a:r>
+              <a:rPr lang="pt-BR" dirty="0" smtClean="0"/>
+              <a:t>CRIAÇÃO DO FLUXOGRAMA DO PROCESSO CANDITATO</a:t>
+            </a:r>
             <a:endParaRPr lang="en-US" dirty="0"/>
           </a:p>
         </p:txBody>
@@ -4460,32 +8304,103 @@
         </p:nvSpPr>
         <p:spPr/>
         <p:txBody>
-          <a:bodyPr/>
+          <a:bodyPr>
+            <a:normAutofit lnSpcReduction="10000"/>
+          </a:bodyPr>
           <a:lstStyle/>
           <a:p>
             <a:r>
               <a:rPr lang="pt-BR" dirty="0" smtClean="0"/>
-              <a:t>Padrão do Workflow muitas vezes segue caminhos diferente do SIPOC</a:t>
-            </a:r>
-          </a:p>
-          <a:p>
+              <a:t>Objetivo:  </a:t>
+            </a:r>
+          </a:p>
+          <a:p>
+            <a:pPr lvl="1"/>
             <a:r>
               <a:rPr lang="pt-BR" dirty="0" smtClean="0"/>
-              <a:t>Identificados alguns gargalos por motivos não muito definidos(</a:t>
+              <a:t>Realizar a criação do fluxograma </a:t>
+            </a:r>
+            <a:r>
+              <a:rPr lang="pt-BR" dirty="0"/>
+              <a:t>na ferramenta </a:t>
+            </a:r>
+            <a:r>
+              <a:rPr lang="pt-BR" dirty="0" smtClean="0"/>
+              <a:t>Yaoqiang-BPMN-Editor-5.1.3.exe ( </a:t>
             </a:r>
             <a:r>
               <a:rPr lang="pt-BR" dirty="0" err="1" smtClean="0"/>
-              <a:t>Ex</a:t>
+              <a:t>Free</a:t>
+            </a:r>
+            <a:r>
+              <a:rPr lang="pt-BR" dirty="0"/>
+              <a:t>) pelo site </a:t>
+            </a:r>
+            <a:r>
+              <a:rPr lang="pt-BR" dirty="0">
+                <a:hlinkClick r:id="rId2"/>
+              </a:rPr>
+              <a:t>https://sourceforge.net/projects/bpmn/?</a:t>
+            </a:r>
+            <a:r>
+              <a:rPr lang="pt-BR" dirty="0" smtClean="0">
+                <a:hlinkClick r:id="rId2"/>
+              </a:rPr>
+              <a:t>source=typ_redirect</a:t>
             </a:r>
             <a:r>
               <a:rPr lang="pt-BR" dirty="0" smtClean="0"/>
-              <a:t>: Aguardando Emissão)</a:t>
-            </a:r>
-          </a:p>
-          <a:p>
+              <a:t> . Esta ferramenta é auto executável e portável; * </a:t>
+            </a:r>
+            <a:r>
+              <a:rPr lang="pt-BR" dirty="0" err="1" smtClean="0">
+                <a:solidFill>
+                  <a:srgbClr val="FF0000"/>
+                </a:solidFill>
+              </a:rPr>
+              <a:t>Sourceforge</a:t>
+            </a:r>
+            <a:r>
+              <a:rPr lang="pt-BR" dirty="0" smtClean="0">
+                <a:solidFill>
+                  <a:srgbClr val="FF0000"/>
+                </a:solidFill>
+              </a:rPr>
+              <a:t> é um dos maiores sites que hospedam projetos </a:t>
+            </a:r>
+            <a:r>
+              <a:rPr lang="pt-BR" dirty="0" err="1" smtClean="0">
+                <a:solidFill>
+                  <a:srgbClr val="FF0000"/>
+                </a:solidFill>
+              </a:rPr>
+              <a:t>opensource</a:t>
+            </a:r>
             <a:r>
               <a:rPr lang="pt-BR" dirty="0" smtClean="0"/>
-              <a:t>Aprovações que poderiam ser feitas em paralelo.</a:t>
+              <a:t>.</a:t>
+            </a:r>
+          </a:p>
+          <a:p>
+            <a:pPr lvl="1"/>
+            <a:r>
+              <a:rPr lang="pt-BR" dirty="0" smtClean="0"/>
+              <a:t>Iniciar discussão sobre as diferentes áreas identificadas nos </a:t>
+            </a:r>
+            <a:r>
+              <a:rPr lang="pt-BR" dirty="0" err="1" smtClean="0"/>
+              <a:t>PAD’s</a:t>
+            </a:r>
+            <a:r>
+              <a:rPr lang="pt-BR" dirty="0" smtClean="0"/>
+              <a:t> coletados;</a:t>
+            </a:r>
+          </a:p>
+          <a:p>
+            <a:pPr lvl="2"/>
+            <a:r>
+              <a:rPr lang="pt-BR" dirty="0" smtClean="0"/>
+              <a:t>Eles pertencem à áreas superiores que os agrupam?</a:t>
             </a:r>
             <a:endParaRPr lang="en-US" dirty="0"/>
           </a:p>
@@ -4494,13 +8409,20 @@
     </p:spTree>
     <p:extLst>
       <p:ext uri="{BB962C8B-B14F-4D97-AF65-F5344CB8AC3E}">
-        <p14:creationId xmlns:p14="http://schemas.microsoft.com/office/powerpoint/2010/main" val="3933182084"/>
+        <p14:creationId xmlns:p14="http://schemas.microsoft.com/office/powerpoint/2010/main" val="3237928119"/>
       </p:ext>
     </p:extLst>
   </p:cSld>
   <p:clrMapOvr>
     <a:masterClrMapping/>
   </p:clrMapOvr>
+  <p:timing>
+    <p:tnLst>
+      <p:par>
+        <p:cTn id="1" dur="indefinite" restart="never" nodeType="tmRoot"/>
+      </p:par>
+    </p:tnLst>
+  </p:timing>
 </p:sld>
 </file>
 

</xml_diff>

<commit_message>
Finalizada a atualizacao de todos os PADS para o consolidador
</commit_message>
<xml_diff>
--- a/Apresentações - ATAS de Reunião/TRE – Projeto PUC PR_16122016.pptx
+++ b/Apresentações - ATAS de Reunião/TRE – Projeto PUC PR_16122016.pptx
@@ -373,11 +373,11 @@
           <c:showBubbleSize val="0"/>
         </c:dLbls>
         <c:gapWidth val="150"/>
-        <c:axId val="150441472"/>
-        <c:axId val="163779072"/>
+        <c:axId val="170968576"/>
+        <c:axId val="128143872"/>
       </c:barChart>
       <c:catAx>
-        <c:axId val="150441472"/>
+        <c:axId val="170968576"/>
         <c:scaling>
           <c:orientation val="minMax"/>
         </c:scaling>
@@ -396,7 +396,7 @@
             <a:endParaRPr lang="en-US"/>
           </a:p>
         </c:txPr>
-        <c:crossAx val="163779072"/>
+        <c:crossAx val="128143872"/>
         <c:crosses val="autoZero"/>
         <c:auto val="1"/>
         <c:lblAlgn val="ctr"/>
@@ -404,7 +404,7 @@
         <c:noMultiLvlLbl val="0"/>
       </c:catAx>
       <c:valAx>
-        <c:axId val="163779072"/>
+        <c:axId val="128143872"/>
         <c:scaling>
           <c:orientation val="minMax"/>
         </c:scaling>
@@ -415,7 +415,7 @@
         <c:majorTickMark val="out"/>
         <c:minorTickMark val="none"/>
         <c:tickLblPos val="nextTo"/>
-        <c:crossAx val="150441472"/>
+        <c:crossAx val="170968576"/>
         <c:crosses val="autoZero"/>
         <c:crossBetween val="between"/>
       </c:valAx>
@@ -640,11 +640,11 @@
           <c:showBubbleSize val="0"/>
         </c:dLbls>
         <c:gapWidth val="182"/>
-        <c:axId val="147076608"/>
-        <c:axId val="146966208"/>
+        <c:axId val="170841600"/>
+        <c:axId val="128145024"/>
       </c:barChart>
       <c:catAx>
-        <c:axId val="147076608"/>
+        <c:axId val="170841600"/>
         <c:scaling>
           <c:orientation val="minMax"/>
         </c:scaling>
@@ -687,7 +687,7 @@
             <a:endParaRPr lang="en-US"/>
           </a:p>
         </c:txPr>
-        <c:crossAx val="146966208"/>
+        <c:crossAx val="128145024"/>
         <c:crosses val="autoZero"/>
         <c:auto val="1"/>
         <c:lblAlgn val="ctr"/>
@@ -695,7 +695,7 @@
         <c:noMultiLvlLbl val="0"/>
       </c:catAx>
       <c:valAx>
-        <c:axId val="146966208"/>
+        <c:axId val="128145024"/>
         <c:scaling>
           <c:orientation val="minMax"/>
         </c:scaling>
@@ -746,7 +746,7 @@
             <a:endParaRPr lang="en-US"/>
           </a:p>
         </c:txPr>
-        <c:crossAx val="147076608"/>
+        <c:crossAx val="170841600"/>
         <c:crosses val="autoZero"/>
         <c:crossBetween val="between"/>
       </c:valAx>
@@ -984,11 +984,11 @@
           <c:showBubbleSize val="0"/>
         </c:dLbls>
         <c:gapWidth val="182"/>
-        <c:axId val="14239744"/>
-        <c:axId val="164880384"/>
+        <c:axId val="170970624"/>
+        <c:axId val="171548672"/>
       </c:barChart>
       <c:catAx>
-        <c:axId val="14239744"/>
+        <c:axId val="170970624"/>
         <c:scaling>
           <c:orientation val="minMax"/>
         </c:scaling>
@@ -1031,7 +1031,7 @@
             <a:endParaRPr lang="en-US"/>
           </a:p>
         </c:txPr>
-        <c:crossAx val="164880384"/>
+        <c:crossAx val="171548672"/>
         <c:crosses val="autoZero"/>
         <c:auto val="1"/>
         <c:lblAlgn val="ctr"/>
@@ -1039,7 +1039,7 @@
         <c:noMultiLvlLbl val="0"/>
       </c:catAx>
       <c:valAx>
-        <c:axId val="164880384"/>
+        <c:axId val="171548672"/>
         <c:scaling>
           <c:orientation val="minMax"/>
         </c:scaling>
@@ -1090,7 +1090,7 @@
             <a:endParaRPr lang="en-US"/>
           </a:p>
         </c:txPr>
-        <c:crossAx val="14239744"/>
+        <c:crossAx val="170970624"/>
         <c:crosses val="autoZero"/>
         <c:crossBetween val="between"/>
       </c:valAx>
@@ -1317,7 +1317,7 @@
           <a:p>
             <a:fld id="{032518DB-2FC4-4C78-9078-69FD04C86135}" type="datetimeFigureOut">
               <a:rPr lang="en-US" smtClean="0"/>
-              <a:t>12/15/2016</a:t>
+              <a:t>12/20/2016</a:t>
             </a:fld>
             <a:endParaRPr lang="en-US"/>
           </a:p>
@@ -1487,7 +1487,7 @@
           <a:p>
             <a:fld id="{032518DB-2FC4-4C78-9078-69FD04C86135}" type="datetimeFigureOut">
               <a:rPr lang="en-US" smtClean="0"/>
-              <a:t>12/15/2016</a:t>
+              <a:t>12/20/2016</a:t>
             </a:fld>
             <a:endParaRPr lang="en-US"/>
           </a:p>
@@ -1667,7 +1667,7 @@
           <a:p>
             <a:fld id="{032518DB-2FC4-4C78-9078-69FD04C86135}" type="datetimeFigureOut">
               <a:rPr lang="en-US" smtClean="0"/>
-              <a:t>12/15/2016</a:t>
+              <a:t>12/20/2016</a:t>
             </a:fld>
             <a:endParaRPr lang="en-US"/>
           </a:p>
@@ -1837,7 +1837,7 @@
           <a:p>
             <a:fld id="{032518DB-2FC4-4C78-9078-69FD04C86135}" type="datetimeFigureOut">
               <a:rPr lang="en-US" smtClean="0"/>
-              <a:t>12/15/2016</a:t>
+              <a:t>12/20/2016</a:t>
             </a:fld>
             <a:endParaRPr lang="en-US"/>
           </a:p>
@@ -2083,7 +2083,7 @@
           <a:p>
             <a:fld id="{032518DB-2FC4-4C78-9078-69FD04C86135}" type="datetimeFigureOut">
               <a:rPr lang="en-US" smtClean="0"/>
-              <a:t>12/15/2016</a:t>
+              <a:t>12/20/2016</a:t>
             </a:fld>
             <a:endParaRPr lang="en-US"/>
           </a:p>
@@ -2371,7 +2371,7 @@
           <a:p>
             <a:fld id="{032518DB-2FC4-4C78-9078-69FD04C86135}" type="datetimeFigureOut">
               <a:rPr lang="en-US" smtClean="0"/>
-              <a:t>12/15/2016</a:t>
+              <a:t>12/20/2016</a:t>
             </a:fld>
             <a:endParaRPr lang="en-US"/>
           </a:p>
@@ -2793,7 +2793,7 @@
           <a:p>
             <a:fld id="{032518DB-2FC4-4C78-9078-69FD04C86135}" type="datetimeFigureOut">
               <a:rPr lang="en-US" smtClean="0"/>
-              <a:t>12/15/2016</a:t>
+              <a:t>12/20/2016</a:t>
             </a:fld>
             <a:endParaRPr lang="en-US"/>
           </a:p>
@@ -2911,7 +2911,7 @@
           <a:p>
             <a:fld id="{032518DB-2FC4-4C78-9078-69FD04C86135}" type="datetimeFigureOut">
               <a:rPr lang="en-US" smtClean="0"/>
-              <a:t>12/15/2016</a:t>
+              <a:t>12/20/2016</a:t>
             </a:fld>
             <a:endParaRPr lang="en-US"/>
           </a:p>
@@ -3006,7 +3006,7 @@
           <a:p>
             <a:fld id="{032518DB-2FC4-4C78-9078-69FD04C86135}" type="datetimeFigureOut">
               <a:rPr lang="en-US" smtClean="0"/>
-              <a:t>12/15/2016</a:t>
+              <a:t>12/20/2016</a:t>
             </a:fld>
             <a:endParaRPr lang="en-US"/>
           </a:p>
@@ -3283,7 +3283,7 @@
           <a:p>
             <a:fld id="{032518DB-2FC4-4C78-9078-69FD04C86135}" type="datetimeFigureOut">
               <a:rPr lang="en-US" smtClean="0"/>
-              <a:t>12/15/2016</a:t>
+              <a:t>12/20/2016</a:t>
             </a:fld>
             <a:endParaRPr lang="en-US"/>
           </a:p>
@@ -3536,7 +3536,7 @@
           <a:p>
             <a:fld id="{032518DB-2FC4-4C78-9078-69FD04C86135}" type="datetimeFigureOut">
               <a:rPr lang="en-US" smtClean="0"/>
-              <a:t>12/15/2016</a:t>
+              <a:t>12/20/2016</a:t>
             </a:fld>
             <a:endParaRPr lang="en-US"/>
           </a:p>
@@ -3749,7 +3749,7 @@
           <a:p>
             <a:fld id="{032518DB-2FC4-4C78-9078-69FD04C86135}" type="datetimeFigureOut">
               <a:rPr lang="en-US" smtClean="0"/>
-              <a:t>12/15/2016</a:t>
+              <a:t>12/20/2016</a:t>
             </a:fld>
             <a:endParaRPr lang="en-US"/>
           </a:p>
@@ -4164,11 +4164,7 @@
           <a:p>
             <a:r>
               <a:rPr lang="pt-BR" dirty="0" smtClean="0"/>
-              <a:t>Reunião: </a:t>
-            </a:r>
-            <a:r>
-              <a:rPr lang="pt-BR" dirty="0" smtClean="0"/>
-              <a:t>16/12/2016</a:t>
+              <a:t>Reunião: 16/12/2016</a:t>
             </a:r>
             <a:endParaRPr lang="en-US" dirty="0"/>
           </a:p>
@@ -4461,21 +4457,8 @@
           <a:p>
             <a:r>
               <a:rPr lang="pt-BR" dirty="0" smtClean="0"/>
-              <a:t>Padrão do Workflow muitas vezes segue caminhos </a:t>
-            </a:r>
-            <a:r>
-              <a:rPr lang="pt-BR" dirty="0" smtClean="0"/>
-              <a:t>diferentes </a:t>
-            </a:r>
-            <a:r>
-              <a:rPr lang="pt-BR" dirty="0" smtClean="0"/>
-              <a:t>do </a:t>
-            </a:r>
-            <a:r>
-              <a:rPr lang="pt-BR" dirty="0" smtClean="0"/>
-              <a:t>SIPOC( ver lead time estratificado slide 8 e 9 e fluxograma 10);</a:t>
-            </a:r>
-            <a:endParaRPr lang="pt-BR" dirty="0" smtClean="0"/>
+              <a:t>Padrão do Workflow muitas vezes segue caminhos diferentes do SIPOC( ver lead time estratificado slide 8 e 9 e fluxograma 10);</a:t>
+            </a:r>
           </a:p>
           <a:p>
             <a:r>
@@ -4488,11 +4471,7 @@
             </a:r>
             <a:r>
               <a:rPr lang="pt-BR" dirty="0" smtClean="0"/>
-              <a:t>: Aguardando </a:t>
-            </a:r>
-            <a:r>
-              <a:rPr lang="pt-BR" dirty="0" smtClean="0"/>
-              <a:t>Emissão, Aprovação);</a:t>
+              <a:t>: Aguardando Emissão, Aprovação);</a:t>
             </a:r>
           </a:p>
           <a:p>
@@ -4500,7 +4479,6 @@
               <a:rPr lang="pt-BR" dirty="0" smtClean="0"/>
               <a:t>Muitos retornos para etapas anteriores.(Loops);</a:t>
             </a:r>
-            <a:endParaRPr lang="pt-BR" dirty="0" smtClean="0"/>
           </a:p>
         </p:txBody>
       </p:sp>
@@ -4825,7 +4803,11 @@
             </a:r>
             <a:r>
               <a:rPr lang="pt-BR" dirty="0" smtClean="0"/>
-              <a:t>: O PAD 304/16 referente ao serviço de contratação de limpeza dos vidro no interior foi responsável por elevar a média de 205 para 242 , contudo licitação ainda continua com maior  lead time de contratação</a:t>
+              <a:t>: O PAD 304/16 referente ao serviço de contratação de limpeza dos vidro no interior foi responsável por elevar a média de 205 para 242 , contudo licitação ainda continua com maior  lead time de </a:t>
+            </a:r>
+            <a:r>
+              <a:rPr lang="pt-BR" dirty="0" smtClean="0"/>
+              <a:t>contratação- manter como exemplo para brainstorm de ideias</a:t>
             </a:r>
             <a:endParaRPr lang="en-US" dirty="0"/>
           </a:p>
@@ -4841,7 +4823,7 @@
             <p:ph idx="1"/>
             <p:extLst>
               <p:ext uri="{D42A27DB-BD31-4B8C-83A1-F6EECF244321}">
-                <p14:modId xmlns:p14="http://schemas.microsoft.com/office/powerpoint/2010/main" val="1355941395"/>
+                <p14:modId xmlns:p14="http://schemas.microsoft.com/office/powerpoint/2010/main" val="1597306439"/>
               </p:ext>
             </p:extLst>
           </p:nvPr>
@@ -4868,12 +4850,12 @@
                     <a:p>
                       <a:pPr algn="l" fontAlgn="b"/>
                       <a:r>
-                        <a:rPr lang="en-US" sz="1100" u="none" strike="noStrike">
+                        <a:rPr lang="en-US" sz="1100" u="none" strike="noStrike" dirty="0">
                           <a:effectLst/>
                         </a:rPr>
                         <a:t>CATEGORIA</a:t>
                       </a:r>
-                      <a:endParaRPr lang="en-US" sz="1100" b="0" i="0" u="none" strike="noStrike">
+                      <a:endParaRPr lang="en-US" sz="1100" b="0" i="0" u="none" strike="noStrike" dirty="0">
                         <a:solidFill>
                           <a:srgbClr val="000000"/>
                         </a:solidFill>
@@ -4916,12 +4898,30 @@
                     <a:p>
                       <a:pPr algn="l" fontAlgn="b"/>
                       <a:r>
-                        <a:rPr lang="en-US" sz="1100" u="none" strike="noStrike">
+                        <a:rPr lang="en-US" sz="1100" u="none" strike="noStrike" dirty="0" err="1" smtClean="0">
                           <a:effectLst/>
                         </a:rPr>
                         <a:t>Licitação</a:t>
                       </a:r>
-                      <a:endParaRPr lang="en-US" sz="1100" b="0" i="0" u="none" strike="noStrike">
+                      <a:r>
+                        <a:rPr lang="en-US" sz="1100" u="none" strike="noStrike" dirty="0" smtClean="0">
+                          <a:effectLst/>
+                        </a:rPr>
+                        <a:t> (</a:t>
+                      </a:r>
+                      <a:r>
+                        <a:rPr lang="en-US" sz="1100" u="none" strike="noStrike" dirty="0" err="1" smtClean="0">
+                          <a:effectLst/>
+                        </a:rPr>
+                        <a:t>Pregão</a:t>
+                      </a:r>
+                      <a:r>
+                        <a:rPr lang="en-US" sz="1100" u="none" strike="noStrike" dirty="0" smtClean="0">
+                          <a:effectLst/>
+                        </a:rPr>
+                        <a:t>)</a:t>
+                      </a:r>
+                      <a:endParaRPr lang="en-US" sz="1100" b="0" i="0" u="none" strike="noStrike" dirty="0">
                         <a:solidFill>
                           <a:srgbClr val="000000"/>
                         </a:solidFill>
@@ -4964,12 +4964,12 @@
                     <a:p>
                       <a:pPr algn="l" fontAlgn="b"/>
                       <a:r>
-                        <a:rPr lang="en-US" sz="1100" u="none" strike="noStrike">
+                        <a:rPr lang="en-US" sz="1100" u="none" strike="noStrike" dirty="0" err="1">
                           <a:effectLst/>
                         </a:rPr>
                         <a:t>Dispensa</a:t>
                       </a:r>
-                      <a:endParaRPr lang="en-US" sz="1100" b="0" i="0" u="none" strike="noStrike">
+                      <a:endParaRPr lang="en-US" sz="1100" b="0" i="0" u="none" strike="noStrike" dirty="0">
                         <a:solidFill>
                           <a:srgbClr val="000000"/>
                         </a:solidFill>
@@ -5012,12 +5012,24 @@
                     <a:p>
                       <a:pPr algn="l" fontAlgn="b"/>
                       <a:r>
-                        <a:rPr lang="en-US" sz="1100" u="none" strike="noStrike">
+                        <a:rPr lang="en-US" sz="1100" u="none" strike="noStrike" dirty="0" err="1">
                           <a:effectLst/>
                         </a:rPr>
-                        <a:t>Registro Preços</a:t>
+                        <a:t>Registro</a:t>
                       </a:r>
-                      <a:endParaRPr lang="en-US" sz="1100" b="0" i="0" u="none" strike="noStrike">
+                      <a:r>
+                        <a:rPr lang="en-US" sz="1100" u="none" strike="noStrike" dirty="0">
+                          <a:effectLst/>
+                        </a:rPr>
+                        <a:t> </a:t>
+                      </a:r>
+                      <a:r>
+                        <a:rPr lang="en-US" sz="1100" u="none" strike="noStrike" dirty="0" err="1">
+                          <a:effectLst/>
+                        </a:rPr>
+                        <a:t>Preços</a:t>
+                      </a:r>
+                      <a:endParaRPr lang="en-US" sz="1100" b="0" i="0" u="none" strike="noStrike" dirty="0">
                         <a:solidFill>
                           <a:srgbClr val="000000"/>
                         </a:solidFill>

</xml_diff>

<commit_message>
Incluida a planilha padrao para Apresentacao
</commit_message>
<xml_diff>
--- a/Apresentações - ATAS de Reunião/TRE – Projeto PUC PR_16122016.pptx
+++ b/Apresentações - ATAS de Reunião/TRE – Projeto PUC PR_16122016.pptx
@@ -373,11 +373,11 @@
           <c:showBubbleSize val="0"/>
         </c:dLbls>
         <c:gapWidth val="150"/>
-        <c:axId val="170968576"/>
-        <c:axId val="128143872"/>
+        <c:axId val="136635904"/>
+        <c:axId val="134885888"/>
       </c:barChart>
       <c:catAx>
-        <c:axId val="170968576"/>
+        <c:axId val="136635904"/>
         <c:scaling>
           <c:orientation val="minMax"/>
         </c:scaling>
@@ -396,7 +396,7 @@
             <a:endParaRPr lang="en-US"/>
           </a:p>
         </c:txPr>
-        <c:crossAx val="128143872"/>
+        <c:crossAx val="134885888"/>
         <c:crosses val="autoZero"/>
         <c:auto val="1"/>
         <c:lblAlgn val="ctr"/>
@@ -404,7 +404,7 @@
         <c:noMultiLvlLbl val="0"/>
       </c:catAx>
       <c:valAx>
-        <c:axId val="128143872"/>
+        <c:axId val="134885888"/>
         <c:scaling>
           <c:orientation val="minMax"/>
         </c:scaling>
@@ -415,7 +415,7 @@
         <c:majorTickMark val="out"/>
         <c:minorTickMark val="none"/>
         <c:tickLblPos val="nextTo"/>
-        <c:crossAx val="170968576"/>
+        <c:crossAx val="136635904"/>
         <c:crosses val="autoZero"/>
         <c:crossBetween val="between"/>
       </c:valAx>
@@ -640,11 +640,11 @@
           <c:showBubbleSize val="0"/>
         </c:dLbls>
         <c:gapWidth val="182"/>
-        <c:axId val="170841600"/>
-        <c:axId val="128145024"/>
+        <c:axId val="172422656"/>
+        <c:axId val="134887040"/>
       </c:barChart>
       <c:catAx>
-        <c:axId val="170841600"/>
+        <c:axId val="172422656"/>
         <c:scaling>
           <c:orientation val="minMax"/>
         </c:scaling>
@@ -687,7 +687,7 @@
             <a:endParaRPr lang="en-US"/>
           </a:p>
         </c:txPr>
-        <c:crossAx val="128145024"/>
+        <c:crossAx val="134887040"/>
         <c:crosses val="autoZero"/>
         <c:auto val="1"/>
         <c:lblAlgn val="ctr"/>
@@ -695,7 +695,7 @@
         <c:noMultiLvlLbl val="0"/>
       </c:catAx>
       <c:valAx>
-        <c:axId val="128145024"/>
+        <c:axId val="134887040"/>
         <c:scaling>
           <c:orientation val="minMax"/>
         </c:scaling>
@@ -746,7 +746,7 @@
             <a:endParaRPr lang="en-US"/>
           </a:p>
         </c:txPr>
-        <c:crossAx val="170841600"/>
+        <c:crossAx val="172422656"/>
         <c:crosses val="autoZero"/>
         <c:crossBetween val="between"/>
       </c:valAx>
@@ -984,11 +984,11 @@
           <c:showBubbleSize val="0"/>
         </c:dLbls>
         <c:gapWidth val="182"/>
-        <c:axId val="170970624"/>
-        <c:axId val="171548672"/>
+        <c:axId val="172424192"/>
+        <c:axId val="137273344"/>
       </c:barChart>
       <c:catAx>
-        <c:axId val="170970624"/>
+        <c:axId val="172424192"/>
         <c:scaling>
           <c:orientation val="minMax"/>
         </c:scaling>
@@ -1031,7 +1031,7 @@
             <a:endParaRPr lang="en-US"/>
           </a:p>
         </c:txPr>
-        <c:crossAx val="171548672"/>
+        <c:crossAx val="137273344"/>
         <c:crosses val="autoZero"/>
         <c:auto val="1"/>
         <c:lblAlgn val="ctr"/>
@@ -1039,7 +1039,7 @@
         <c:noMultiLvlLbl val="0"/>
       </c:catAx>
       <c:valAx>
-        <c:axId val="171548672"/>
+        <c:axId val="137273344"/>
         <c:scaling>
           <c:orientation val="minMax"/>
         </c:scaling>
@@ -1090,7 +1090,7 @@
             <a:endParaRPr lang="en-US"/>
           </a:p>
         </c:txPr>
-        <c:crossAx val="170970624"/>
+        <c:crossAx val="172424192"/>
         <c:crosses val="autoZero"/>
         <c:crossBetween val="between"/>
       </c:valAx>
@@ -1317,7 +1317,7 @@
           <a:p>
             <a:fld id="{032518DB-2FC4-4C78-9078-69FD04C86135}" type="datetimeFigureOut">
               <a:rPr lang="en-US" smtClean="0"/>
-              <a:t>12/20/2016</a:t>
+              <a:t>2/7/2017</a:t>
             </a:fld>
             <a:endParaRPr lang="en-US"/>
           </a:p>
@@ -1487,7 +1487,7 @@
           <a:p>
             <a:fld id="{032518DB-2FC4-4C78-9078-69FD04C86135}" type="datetimeFigureOut">
               <a:rPr lang="en-US" smtClean="0"/>
-              <a:t>12/20/2016</a:t>
+              <a:t>2/7/2017</a:t>
             </a:fld>
             <a:endParaRPr lang="en-US"/>
           </a:p>
@@ -1667,7 +1667,7 @@
           <a:p>
             <a:fld id="{032518DB-2FC4-4C78-9078-69FD04C86135}" type="datetimeFigureOut">
               <a:rPr lang="en-US" smtClean="0"/>
-              <a:t>12/20/2016</a:t>
+              <a:t>2/7/2017</a:t>
             </a:fld>
             <a:endParaRPr lang="en-US"/>
           </a:p>
@@ -1837,7 +1837,7 @@
           <a:p>
             <a:fld id="{032518DB-2FC4-4C78-9078-69FD04C86135}" type="datetimeFigureOut">
               <a:rPr lang="en-US" smtClean="0"/>
-              <a:t>12/20/2016</a:t>
+              <a:t>2/7/2017</a:t>
             </a:fld>
             <a:endParaRPr lang="en-US"/>
           </a:p>
@@ -2083,7 +2083,7 @@
           <a:p>
             <a:fld id="{032518DB-2FC4-4C78-9078-69FD04C86135}" type="datetimeFigureOut">
               <a:rPr lang="en-US" smtClean="0"/>
-              <a:t>12/20/2016</a:t>
+              <a:t>2/7/2017</a:t>
             </a:fld>
             <a:endParaRPr lang="en-US"/>
           </a:p>
@@ -2371,7 +2371,7 @@
           <a:p>
             <a:fld id="{032518DB-2FC4-4C78-9078-69FD04C86135}" type="datetimeFigureOut">
               <a:rPr lang="en-US" smtClean="0"/>
-              <a:t>12/20/2016</a:t>
+              <a:t>2/7/2017</a:t>
             </a:fld>
             <a:endParaRPr lang="en-US"/>
           </a:p>
@@ -2793,7 +2793,7 @@
           <a:p>
             <a:fld id="{032518DB-2FC4-4C78-9078-69FD04C86135}" type="datetimeFigureOut">
               <a:rPr lang="en-US" smtClean="0"/>
-              <a:t>12/20/2016</a:t>
+              <a:t>2/7/2017</a:t>
             </a:fld>
             <a:endParaRPr lang="en-US"/>
           </a:p>
@@ -2911,7 +2911,7 @@
           <a:p>
             <a:fld id="{032518DB-2FC4-4C78-9078-69FD04C86135}" type="datetimeFigureOut">
               <a:rPr lang="en-US" smtClean="0"/>
-              <a:t>12/20/2016</a:t>
+              <a:t>2/7/2017</a:t>
             </a:fld>
             <a:endParaRPr lang="en-US"/>
           </a:p>
@@ -3006,7 +3006,7 @@
           <a:p>
             <a:fld id="{032518DB-2FC4-4C78-9078-69FD04C86135}" type="datetimeFigureOut">
               <a:rPr lang="en-US" smtClean="0"/>
-              <a:t>12/20/2016</a:t>
+              <a:t>2/7/2017</a:t>
             </a:fld>
             <a:endParaRPr lang="en-US"/>
           </a:p>
@@ -3283,7 +3283,7 @@
           <a:p>
             <a:fld id="{032518DB-2FC4-4C78-9078-69FD04C86135}" type="datetimeFigureOut">
               <a:rPr lang="en-US" smtClean="0"/>
-              <a:t>12/20/2016</a:t>
+              <a:t>2/7/2017</a:t>
             </a:fld>
             <a:endParaRPr lang="en-US"/>
           </a:p>
@@ -3536,7 +3536,7 @@
           <a:p>
             <a:fld id="{032518DB-2FC4-4C78-9078-69FD04C86135}" type="datetimeFigureOut">
               <a:rPr lang="en-US" smtClean="0"/>
-              <a:t>12/20/2016</a:t>
+              <a:t>2/7/2017</a:t>
             </a:fld>
             <a:endParaRPr lang="en-US"/>
           </a:p>
@@ -3749,7 +3749,7 @@
           <a:p>
             <a:fld id="{032518DB-2FC4-4C78-9078-69FD04C86135}" type="datetimeFigureOut">
               <a:rPr lang="en-US" smtClean="0"/>
-              <a:t>12/20/2016</a:t>
+              <a:t>2/7/2017</a:t>
             </a:fld>
             <a:endParaRPr lang="en-US"/>
           </a:p>
@@ -4803,11 +4803,7 @@
             </a:r>
             <a:r>
               <a:rPr lang="pt-BR" dirty="0" smtClean="0"/>
-              <a:t>: O PAD 304/16 referente ao serviço de contratação de limpeza dos vidro no interior foi responsável por elevar a média de 205 para 242 , contudo licitação ainda continua com maior  lead time de </a:t>
-            </a:r>
-            <a:r>
-              <a:rPr lang="pt-BR" dirty="0" smtClean="0"/>
-              <a:t>contratação- manter como exemplo para brainstorm de ideias</a:t>
+              <a:t>: O PAD 304/16 referente ao serviço de contratação de limpeza dos vidro no interior foi responsável por elevar a média de 205 para 242 , contudo licitação ainda continua com maior  lead time de contratação- manter como exemplo para brainstorm de ideias</a:t>
             </a:r>
             <a:endParaRPr lang="en-US" dirty="0"/>
           </a:p>

</xml_diff>